<commit_message>
Updated TPS report. Broke up 'runPOST' function and its internals across 'docker/dockerBackend.py' and 'docker/tools.py' (and had to modify 'spikes/views.py' slightly as a result). Updated 'docker_wrapper/runContainer.sh' to have better debugging support.
</commit_message>
<xml_diff>
--- a/TPS_Stories.pptx
+++ b/TPS_Stories.pptx
@@ -261,7 +261,7 @@
           <a:bodyPr lIns="0" rIns="0" tIns="0" bIns="0" anchor="b"/>
           <a:p>
             <a:pPr algn="r"/>
-            <a:fld id="{1D947B11-AAC7-47C3-95A2-6DA9B9C20DE3}" type="slidenum">
+            <a:fld id="{F4D5C73C-883A-4F73-A99F-A97E877208CB}" type="slidenum">
               <a:rPr b="0" lang="en-US" sz="1400" spc="-1" strike="noStrike">
                 <a:solidFill>
                   <a:srgbClr val="000000"/>
@@ -314,7 +314,7 @@
       </p:grpSpPr>
       <p:sp>
         <p:nvSpPr>
-          <p:cNvPr id="268" name="PlaceHolder 1"/>
+          <p:cNvPr id="276" name="PlaceHolder 1"/>
           <p:cNvSpPr>
             <a:spLocks noGrp="1"/>
           </p:cNvSpPr>
@@ -325,7 +325,7 @@
         <p:spPr>
           <a:xfrm>
             <a:off x="685800" y="4343400"/>
-            <a:ext cx="5483880" cy="4112280"/>
+            <a:ext cx="5483520" cy="4111920"/>
           </a:xfrm>
           <a:prstGeom prst="rect">
             <a:avLst/>
@@ -350,14 +350,14 @@
       </p:sp>
       <p:sp>
         <p:nvSpPr>
-          <p:cNvPr id="269" name="CustomShape 2"/>
+          <p:cNvPr id="277" name="CustomShape 2"/>
           <p:cNvSpPr/>
           <p:nvPr/>
         </p:nvSpPr>
         <p:spPr>
           <a:xfrm>
             <a:off x="3884760" y="8685360"/>
-            <a:ext cx="2969280" cy="454680"/>
+            <a:ext cx="2968920" cy="454320"/>
           </a:xfrm>
           <a:prstGeom prst="rect">
             <a:avLst/>
@@ -381,7 +381,7 @@
                 <a:spcPct val="100000"/>
               </a:lnSpc>
             </a:pPr>
-            <a:fld id="{559FAFCF-9C54-4E89-82DB-C24FF204C443}" type="slidenum">
+            <a:fld id="{623BB5D9-70F3-43C0-AC4A-33EC2E6DF78D}" type="slidenum">
               <a:rPr b="0" lang="en-US" sz="1200" spc="-1" strike="noStrike">
                 <a:solidFill>
                   <a:srgbClr val="000000"/>
@@ -394,7 +394,7 @@
                 <a:latin typeface="+mn-lt"/>
                 <a:ea typeface="+mn-ea"/>
               </a:rPr>
-              <a:t>&lt;number&gt;</a:t>
+              <a:t>1</a:t>
             </a:fld>
             <a:endParaRPr b="0" lang="en-US" sz="1200" spc="-1" strike="noStrike">
               <a:solidFill>
@@ -434,7 +434,7 @@
       </p:grpSpPr>
       <p:sp>
         <p:nvSpPr>
-          <p:cNvPr id="270" name="PlaceHolder 1"/>
+          <p:cNvPr id="278" name="PlaceHolder 1"/>
           <p:cNvSpPr>
             <a:spLocks noGrp="1"/>
           </p:cNvSpPr>
@@ -445,7 +445,7 @@
         <p:spPr>
           <a:xfrm>
             <a:off x="685800" y="4343400"/>
-            <a:ext cx="5483880" cy="4112280"/>
+            <a:ext cx="5483520" cy="4111920"/>
           </a:xfrm>
           <a:prstGeom prst="rect">
             <a:avLst/>
@@ -470,14 +470,14 @@
       </p:sp>
       <p:sp>
         <p:nvSpPr>
-          <p:cNvPr id="271" name="CustomShape 2"/>
+          <p:cNvPr id="279" name="CustomShape 2"/>
           <p:cNvSpPr/>
           <p:nvPr/>
         </p:nvSpPr>
         <p:spPr>
           <a:xfrm>
             <a:off x="3884760" y="8685360"/>
-            <a:ext cx="2969280" cy="454680"/>
+            <a:ext cx="2968920" cy="454320"/>
           </a:xfrm>
           <a:prstGeom prst="rect">
             <a:avLst/>
@@ -501,7 +501,7 @@
                 <a:spcPct val="100000"/>
               </a:lnSpc>
             </a:pPr>
-            <a:fld id="{0B97C147-1E56-4A03-B520-94B35536D00D}" type="slidenum">
+            <a:fld id="{E4625577-9E4B-437B-90E6-0398B333C24E}" type="slidenum">
               <a:rPr b="0" lang="en-US" sz="1200" spc="-1" strike="noStrike">
                 <a:solidFill>
                   <a:srgbClr val="000000"/>
@@ -514,7 +514,7 @@
                 <a:latin typeface="+mn-lt"/>
                 <a:ea typeface="+mn-ea"/>
               </a:rPr>
-              <a:t>&lt;number&gt;</a:t>
+              <a:t>1</a:t>
             </a:fld>
             <a:endParaRPr b="0" lang="en-US" sz="1200" spc="-1" strike="noStrike">
               <a:solidFill>
@@ -554,7 +554,7 @@
       </p:grpSpPr>
       <p:sp>
         <p:nvSpPr>
-          <p:cNvPr id="272" name="PlaceHolder 1"/>
+          <p:cNvPr id="280" name="PlaceHolder 1"/>
           <p:cNvSpPr>
             <a:spLocks noGrp="1"/>
           </p:cNvSpPr>
@@ -565,7 +565,7 @@
         <p:spPr>
           <a:xfrm>
             <a:off x="685800" y="4343400"/>
-            <a:ext cx="5483880" cy="4112280"/>
+            <a:ext cx="5483520" cy="4111920"/>
           </a:xfrm>
           <a:prstGeom prst="rect">
             <a:avLst/>
@@ -590,14 +590,14 @@
       </p:sp>
       <p:sp>
         <p:nvSpPr>
-          <p:cNvPr id="273" name="CustomShape 2"/>
+          <p:cNvPr id="281" name="CustomShape 2"/>
           <p:cNvSpPr/>
           <p:nvPr/>
         </p:nvSpPr>
         <p:spPr>
           <a:xfrm>
             <a:off x="3884760" y="8685360"/>
-            <a:ext cx="2969280" cy="454680"/>
+            <a:ext cx="2968920" cy="454320"/>
           </a:xfrm>
           <a:prstGeom prst="rect">
             <a:avLst/>
@@ -621,7 +621,7 @@
                 <a:spcPct val="100000"/>
               </a:lnSpc>
             </a:pPr>
-            <a:fld id="{0A791B4E-375F-4C3F-9490-FFECE0B3880B}" type="slidenum">
+            <a:fld id="{446E97AF-379D-4563-86C2-854D7C0AD6FA}" type="slidenum">
               <a:rPr b="0" lang="en-US" sz="1200" spc="-1" strike="noStrike">
                 <a:solidFill>
                   <a:srgbClr val="000000"/>
@@ -716,7 +716,8 @@
         <p:txBody>
           <a:bodyPr lIns="0" rIns="0" tIns="0" bIns="0" anchor="ctr"/>
           <a:p>
-            <a:endParaRPr b="0" lang="en-US" sz="1800" spc="-1" strike="noStrike">
+            <a:pPr algn="ctr"/>
+            <a:endParaRPr b="0" lang="en-US" sz="4400" spc="-1" strike="noStrike">
               <a:solidFill>
                 <a:srgbClr val="000000"/>
               </a:solidFill>
@@ -754,7 +755,7 @@
             <a:normAutofit/>
           </a:bodyPr>
           <a:p>
-            <a:endParaRPr b="0" lang="en-US" sz="1800" spc="-1" strike="noStrike">
+            <a:endParaRPr b="0" lang="en-US" sz="3200" spc="-1" strike="noStrike">
               <a:solidFill>
                 <a:srgbClr val="000000"/>
               </a:solidFill>
@@ -792,7 +793,7 @@
             <a:normAutofit/>
           </a:bodyPr>
           <a:p>
-            <a:endParaRPr b="0" lang="en-US" sz="1800" spc="-1" strike="noStrike">
+            <a:endParaRPr b="0" lang="en-US" sz="3200" spc="-1" strike="noStrike">
               <a:solidFill>
                 <a:srgbClr val="000000"/>
               </a:solidFill>
@@ -850,7 +851,8 @@
         <p:txBody>
           <a:bodyPr lIns="0" rIns="0" tIns="0" bIns="0" anchor="ctr"/>
           <a:p>
-            <a:endParaRPr b="0" lang="en-US" sz="1800" spc="-1" strike="noStrike">
+            <a:pPr algn="ctr"/>
+            <a:endParaRPr b="0" lang="en-US" sz="4400" spc="-1" strike="noStrike">
               <a:solidFill>
                 <a:srgbClr val="000000"/>
               </a:solidFill>
@@ -888,7 +890,7 @@
             <a:normAutofit/>
           </a:bodyPr>
           <a:p>
-            <a:endParaRPr b="0" lang="en-US" sz="1800" spc="-1" strike="noStrike">
+            <a:endParaRPr b="0" lang="en-US" sz="3200" spc="-1" strike="noStrike">
               <a:solidFill>
                 <a:srgbClr val="000000"/>
               </a:solidFill>
@@ -926,7 +928,7 @@
             <a:normAutofit/>
           </a:bodyPr>
           <a:p>
-            <a:endParaRPr b="0" lang="en-US" sz="1800" spc="-1" strike="noStrike">
+            <a:endParaRPr b="0" lang="en-US" sz="3200" spc="-1" strike="noStrike">
               <a:solidFill>
                 <a:srgbClr val="000000"/>
               </a:solidFill>
@@ -964,7 +966,7 @@
             <a:normAutofit/>
           </a:bodyPr>
           <a:p>
-            <a:endParaRPr b="0" lang="en-US" sz="1800" spc="-1" strike="noStrike">
+            <a:endParaRPr b="0" lang="en-US" sz="3200" spc="-1" strike="noStrike">
               <a:solidFill>
                 <a:srgbClr val="000000"/>
               </a:solidFill>
@@ -1002,7 +1004,7 @@
             <a:normAutofit/>
           </a:bodyPr>
           <a:p>
-            <a:endParaRPr b="0" lang="en-US" sz="1800" spc="-1" strike="noStrike">
+            <a:endParaRPr b="0" lang="en-US" sz="3200" spc="-1" strike="noStrike">
               <a:solidFill>
                 <a:srgbClr val="000000"/>
               </a:solidFill>
@@ -1060,7 +1062,8 @@
         <p:txBody>
           <a:bodyPr lIns="0" rIns="0" tIns="0" bIns="0" anchor="ctr"/>
           <a:p>
-            <a:endParaRPr b="0" lang="en-US" sz="1800" spc="-1" strike="noStrike">
+            <a:pPr algn="ctr"/>
+            <a:endParaRPr b="0" lang="en-US" sz="4400" spc="-1" strike="noStrike">
               <a:solidFill>
                 <a:srgbClr val="000000"/>
               </a:solidFill>
@@ -1098,7 +1101,7 @@
             <a:normAutofit/>
           </a:bodyPr>
           <a:p>
-            <a:endParaRPr b="0" lang="en-US" sz="1800" spc="-1" strike="noStrike">
+            <a:endParaRPr b="0" lang="en-US" sz="3200" spc="-1" strike="noStrike">
               <a:solidFill>
                 <a:srgbClr val="000000"/>
               </a:solidFill>
@@ -1136,7 +1139,7 @@
             <a:normAutofit/>
           </a:bodyPr>
           <a:p>
-            <a:endParaRPr b="0" lang="en-US" sz="1800" spc="-1" strike="noStrike">
+            <a:endParaRPr b="0" lang="en-US" sz="3200" spc="-1" strike="noStrike">
               <a:solidFill>
                 <a:srgbClr val="000000"/>
               </a:solidFill>
@@ -1262,7 +1265,8 @@
         <p:txBody>
           <a:bodyPr lIns="0" rIns="0" tIns="0" bIns="0" anchor="ctr"/>
           <a:p>
-            <a:endParaRPr b="0" lang="en-US" sz="1800" spc="-1" strike="noStrike">
+            <a:pPr algn="ctr"/>
+            <a:endParaRPr b="0" lang="en-US" sz="4400" spc="-1" strike="noStrike">
               <a:solidFill>
                 <a:srgbClr val="000000"/>
               </a:solidFill>
@@ -1357,7 +1361,8 @@
         <p:txBody>
           <a:bodyPr lIns="0" rIns="0" tIns="0" bIns="0" anchor="ctr"/>
           <a:p>
-            <a:endParaRPr b="0" lang="en-US" sz="1800" spc="-1" strike="noStrike">
+            <a:pPr algn="ctr"/>
+            <a:endParaRPr b="0" lang="en-US" sz="4400" spc="-1" strike="noStrike">
               <a:solidFill>
                 <a:srgbClr val="000000"/>
               </a:solidFill>
@@ -1395,7 +1400,7 @@
             <a:normAutofit/>
           </a:bodyPr>
           <a:p>
-            <a:endParaRPr b="0" lang="en-US" sz="1800" spc="-1" strike="noStrike">
+            <a:endParaRPr b="0" lang="en-US" sz="3200" spc="-1" strike="noStrike">
               <a:solidFill>
                 <a:srgbClr val="000000"/>
               </a:solidFill>
@@ -1453,7 +1458,8 @@
         <p:txBody>
           <a:bodyPr lIns="0" rIns="0" tIns="0" bIns="0" anchor="ctr"/>
           <a:p>
-            <a:endParaRPr b="0" lang="en-US" sz="1800" spc="-1" strike="noStrike">
+            <a:pPr algn="ctr"/>
+            <a:endParaRPr b="0" lang="en-US" sz="4400" spc="-1" strike="noStrike">
               <a:solidFill>
                 <a:srgbClr val="000000"/>
               </a:solidFill>
@@ -1491,7 +1497,7 @@
             <a:normAutofit/>
           </a:bodyPr>
           <a:p>
-            <a:endParaRPr b="0" lang="en-US" sz="1800" spc="-1" strike="noStrike">
+            <a:endParaRPr b="0" lang="en-US" sz="3200" spc="-1" strike="noStrike">
               <a:solidFill>
                 <a:srgbClr val="000000"/>
               </a:solidFill>
@@ -1529,7 +1535,7 @@
             <a:normAutofit/>
           </a:bodyPr>
           <a:p>
-            <a:endParaRPr b="0" lang="en-US" sz="1800" spc="-1" strike="noStrike">
+            <a:endParaRPr b="0" lang="en-US" sz="3200" spc="-1" strike="noStrike">
               <a:solidFill>
                 <a:srgbClr val="000000"/>
               </a:solidFill>
@@ -1587,7 +1593,8 @@
         <p:txBody>
           <a:bodyPr lIns="0" rIns="0" tIns="0" bIns="0" anchor="ctr"/>
           <a:p>
-            <a:endParaRPr b="0" lang="en-US" sz="1800" spc="-1" strike="noStrike">
+            <a:pPr algn="ctr"/>
+            <a:endParaRPr b="0" lang="en-US" sz="4400" spc="-1" strike="noStrike">
               <a:solidFill>
                 <a:srgbClr val="000000"/>
               </a:solidFill>
@@ -1704,7 +1711,8 @@
         <p:txBody>
           <a:bodyPr lIns="0" rIns="0" tIns="0" bIns="0" anchor="ctr"/>
           <a:p>
-            <a:endParaRPr b="0" lang="en-US" sz="1800" spc="-1" strike="noStrike">
+            <a:pPr algn="ctr"/>
+            <a:endParaRPr b="0" lang="en-US" sz="4400" spc="-1" strike="noStrike">
               <a:solidFill>
                 <a:srgbClr val="000000"/>
               </a:solidFill>
@@ -1742,7 +1750,7 @@
             <a:normAutofit/>
           </a:bodyPr>
           <a:p>
-            <a:endParaRPr b="0" lang="en-US" sz="1800" spc="-1" strike="noStrike">
+            <a:endParaRPr b="0" lang="en-US" sz="3200" spc="-1" strike="noStrike">
               <a:solidFill>
                 <a:srgbClr val="000000"/>
               </a:solidFill>
@@ -1780,7 +1788,7 @@
             <a:normAutofit/>
           </a:bodyPr>
           <a:p>
-            <a:endParaRPr b="0" lang="en-US" sz="1800" spc="-1" strike="noStrike">
+            <a:endParaRPr b="0" lang="en-US" sz="3200" spc="-1" strike="noStrike">
               <a:solidFill>
                 <a:srgbClr val="000000"/>
               </a:solidFill>
@@ -1818,7 +1826,7 @@
             <a:normAutofit/>
           </a:bodyPr>
           <a:p>
-            <a:endParaRPr b="0" lang="en-US" sz="1800" spc="-1" strike="noStrike">
+            <a:endParaRPr b="0" lang="en-US" sz="3200" spc="-1" strike="noStrike">
               <a:solidFill>
                 <a:srgbClr val="000000"/>
               </a:solidFill>
@@ -1876,7 +1884,8 @@
         <p:txBody>
           <a:bodyPr lIns="0" rIns="0" tIns="0" bIns="0" anchor="ctr"/>
           <a:p>
-            <a:endParaRPr b="0" lang="en-US" sz="1800" spc="-1" strike="noStrike">
+            <a:pPr algn="ctr"/>
+            <a:endParaRPr b="0" lang="en-US" sz="4400" spc="-1" strike="noStrike">
               <a:solidFill>
                 <a:srgbClr val="000000"/>
               </a:solidFill>
@@ -1971,7 +1980,8 @@
         <p:txBody>
           <a:bodyPr lIns="0" rIns="0" tIns="0" bIns="0" anchor="ctr"/>
           <a:p>
-            <a:endParaRPr b="0" lang="en-US" sz="1800" spc="-1" strike="noStrike">
+            <a:pPr algn="ctr"/>
+            <a:endParaRPr b="0" lang="en-US" sz="4400" spc="-1" strike="noStrike">
               <a:solidFill>
                 <a:srgbClr val="000000"/>
               </a:solidFill>
@@ -2009,7 +2019,7 @@
             <a:normAutofit/>
           </a:bodyPr>
           <a:p>
-            <a:endParaRPr b="0" lang="en-US" sz="1800" spc="-1" strike="noStrike">
+            <a:endParaRPr b="0" lang="en-US" sz="3200" spc="-1" strike="noStrike">
               <a:solidFill>
                 <a:srgbClr val="000000"/>
               </a:solidFill>
@@ -2047,7 +2057,7 @@
             <a:normAutofit/>
           </a:bodyPr>
           <a:p>
-            <a:endParaRPr b="0" lang="en-US" sz="1800" spc="-1" strike="noStrike">
+            <a:endParaRPr b="0" lang="en-US" sz="3200" spc="-1" strike="noStrike">
               <a:solidFill>
                 <a:srgbClr val="000000"/>
               </a:solidFill>
@@ -2085,7 +2095,7 @@
             <a:normAutofit/>
           </a:bodyPr>
           <a:p>
-            <a:endParaRPr b="0" lang="en-US" sz="1800" spc="-1" strike="noStrike">
+            <a:endParaRPr b="0" lang="en-US" sz="3200" spc="-1" strike="noStrike">
               <a:solidFill>
                 <a:srgbClr val="000000"/>
               </a:solidFill>
@@ -2143,7 +2153,8 @@
         <p:txBody>
           <a:bodyPr lIns="0" rIns="0" tIns="0" bIns="0" anchor="ctr"/>
           <a:p>
-            <a:endParaRPr b="0" lang="en-US" sz="1800" spc="-1" strike="noStrike">
+            <a:pPr algn="ctr"/>
+            <a:endParaRPr b="0" lang="en-US" sz="4400" spc="-1" strike="noStrike">
               <a:solidFill>
                 <a:srgbClr val="000000"/>
               </a:solidFill>
@@ -2181,7 +2192,7 @@
             <a:normAutofit/>
           </a:bodyPr>
           <a:p>
-            <a:endParaRPr b="0" lang="en-US" sz="1800" spc="-1" strike="noStrike">
+            <a:endParaRPr b="0" lang="en-US" sz="3200" spc="-1" strike="noStrike">
               <a:solidFill>
                 <a:srgbClr val="000000"/>
               </a:solidFill>
@@ -2219,7 +2230,7 @@
             <a:normAutofit/>
           </a:bodyPr>
           <a:p>
-            <a:endParaRPr b="0" lang="en-US" sz="1800" spc="-1" strike="noStrike">
+            <a:endParaRPr b="0" lang="en-US" sz="3200" spc="-1" strike="noStrike">
               <a:solidFill>
                 <a:srgbClr val="000000"/>
               </a:solidFill>
@@ -2257,7 +2268,7 @@
             <a:normAutofit/>
           </a:bodyPr>
           <a:p>
-            <a:endParaRPr b="0" lang="en-US" sz="1800" spc="-1" strike="noStrike">
+            <a:endParaRPr b="0" lang="en-US" sz="3200" spc="-1" strike="noStrike">
               <a:solidFill>
                 <a:srgbClr val="000000"/>
               </a:solidFill>
@@ -2315,7 +2326,8 @@
         <p:txBody>
           <a:bodyPr lIns="0" rIns="0" tIns="0" bIns="0" anchor="ctr"/>
           <a:p>
-            <a:endParaRPr b="0" lang="en-US" sz="1800" spc="-1" strike="noStrike">
+            <a:pPr algn="ctr"/>
+            <a:endParaRPr b="0" lang="en-US" sz="4400" spc="-1" strike="noStrike">
               <a:solidFill>
                 <a:srgbClr val="000000"/>
               </a:solidFill>
@@ -2353,7 +2365,7 @@
             <a:normAutofit/>
           </a:bodyPr>
           <a:p>
-            <a:endParaRPr b="0" lang="en-US" sz="1800" spc="-1" strike="noStrike">
+            <a:endParaRPr b="0" lang="en-US" sz="3200" spc="-1" strike="noStrike">
               <a:solidFill>
                 <a:srgbClr val="000000"/>
               </a:solidFill>
@@ -2391,7 +2403,7 @@
             <a:normAutofit/>
           </a:bodyPr>
           <a:p>
-            <a:endParaRPr b="0" lang="en-US" sz="1800" spc="-1" strike="noStrike">
+            <a:endParaRPr b="0" lang="en-US" sz="3200" spc="-1" strike="noStrike">
               <a:solidFill>
                 <a:srgbClr val="000000"/>
               </a:solidFill>
@@ -2449,7 +2461,8 @@
         <p:txBody>
           <a:bodyPr lIns="0" rIns="0" tIns="0" bIns="0" anchor="ctr"/>
           <a:p>
-            <a:endParaRPr b="0" lang="en-US" sz="1800" spc="-1" strike="noStrike">
+            <a:pPr algn="ctr"/>
+            <a:endParaRPr b="0" lang="en-US" sz="4400" spc="-1" strike="noStrike">
               <a:solidFill>
                 <a:srgbClr val="000000"/>
               </a:solidFill>
@@ -2487,7 +2500,7 @@
             <a:normAutofit/>
           </a:bodyPr>
           <a:p>
-            <a:endParaRPr b="0" lang="en-US" sz="1800" spc="-1" strike="noStrike">
+            <a:endParaRPr b="0" lang="en-US" sz="3200" spc="-1" strike="noStrike">
               <a:solidFill>
                 <a:srgbClr val="000000"/>
               </a:solidFill>
@@ -2525,7 +2538,7 @@
             <a:normAutofit/>
           </a:bodyPr>
           <a:p>
-            <a:endParaRPr b="0" lang="en-US" sz="1800" spc="-1" strike="noStrike">
+            <a:endParaRPr b="0" lang="en-US" sz="3200" spc="-1" strike="noStrike">
               <a:solidFill>
                 <a:srgbClr val="000000"/>
               </a:solidFill>
@@ -2563,7 +2576,7 @@
             <a:normAutofit/>
           </a:bodyPr>
           <a:p>
-            <a:endParaRPr b="0" lang="en-US" sz="1800" spc="-1" strike="noStrike">
+            <a:endParaRPr b="0" lang="en-US" sz="3200" spc="-1" strike="noStrike">
               <a:solidFill>
                 <a:srgbClr val="000000"/>
               </a:solidFill>
@@ -2601,7 +2614,7 @@
             <a:normAutofit/>
           </a:bodyPr>
           <a:p>
-            <a:endParaRPr b="0" lang="en-US" sz="1800" spc="-1" strike="noStrike">
+            <a:endParaRPr b="0" lang="en-US" sz="3200" spc="-1" strike="noStrike">
               <a:solidFill>
                 <a:srgbClr val="000000"/>
               </a:solidFill>
@@ -2659,7 +2672,8 @@
         <p:txBody>
           <a:bodyPr lIns="0" rIns="0" tIns="0" bIns="0" anchor="ctr"/>
           <a:p>
-            <a:endParaRPr b="0" lang="en-US" sz="1800" spc="-1" strike="noStrike">
+            <a:pPr algn="ctr"/>
+            <a:endParaRPr b="0" lang="en-US" sz="4400" spc="-1" strike="noStrike">
               <a:solidFill>
                 <a:srgbClr val="000000"/>
               </a:solidFill>
@@ -2697,7 +2711,7 @@
             <a:normAutofit/>
           </a:bodyPr>
           <a:p>
-            <a:endParaRPr b="0" lang="en-US" sz="1800" spc="-1" strike="noStrike">
+            <a:endParaRPr b="0" lang="en-US" sz="3200" spc="-1" strike="noStrike">
               <a:solidFill>
                 <a:srgbClr val="000000"/>
               </a:solidFill>
@@ -2735,7 +2749,7 @@
             <a:normAutofit/>
           </a:bodyPr>
           <a:p>
-            <a:endParaRPr b="0" lang="en-US" sz="1800" spc="-1" strike="noStrike">
+            <a:endParaRPr b="0" lang="en-US" sz="3200" spc="-1" strike="noStrike">
               <a:solidFill>
                 <a:srgbClr val="000000"/>
               </a:solidFill>
@@ -2839,7 +2853,8 @@
         <p:txBody>
           <a:bodyPr lIns="0" rIns="0" tIns="0" bIns="0" anchor="ctr"/>
           <a:p>
-            <a:endParaRPr b="0" lang="en-US" sz="1800" spc="-1" strike="noStrike">
+            <a:pPr algn="ctr"/>
+            <a:endParaRPr b="0" lang="en-US" sz="4400" spc="-1" strike="noStrike">
               <a:solidFill>
                 <a:srgbClr val="000000"/>
               </a:solidFill>
@@ -2877,7 +2892,7 @@
             <a:normAutofit/>
           </a:bodyPr>
           <a:p>
-            <a:endParaRPr b="0" lang="en-US" sz="1800" spc="-1" strike="noStrike">
+            <a:endParaRPr b="0" lang="en-US" sz="3200" spc="-1" strike="noStrike">
               <a:solidFill>
                 <a:srgbClr val="000000"/>
               </a:solidFill>
@@ -2935,7 +2950,8 @@
         <p:txBody>
           <a:bodyPr lIns="0" rIns="0" tIns="0" bIns="0" anchor="ctr"/>
           <a:p>
-            <a:endParaRPr b="0" lang="en-US" sz="1800" spc="-1" strike="noStrike">
+            <a:pPr algn="ctr"/>
+            <a:endParaRPr b="0" lang="en-US" sz="4400" spc="-1" strike="noStrike">
               <a:solidFill>
                 <a:srgbClr val="000000"/>
               </a:solidFill>
@@ -2973,7 +2989,7 @@
             <a:normAutofit/>
           </a:bodyPr>
           <a:p>
-            <a:endParaRPr b="0" lang="en-US" sz="1800" spc="-1" strike="noStrike">
+            <a:endParaRPr b="0" lang="en-US" sz="3200" spc="-1" strike="noStrike">
               <a:solidFill>
                 <a:srgbClr val="000000"/>
               </a:solidFill>
@@ -3011,7 +3027,7 @@
             <a:normAutofit/>
           </a:bodyPr>
           <a:p>
-            <a:endParaRPr b="0" lang="en-US" sz="1800" spc="-1" strike="noStrike">
+            <a:endParaRPr b="0" lang="en-US" sz="3200" spc="-1" strike="noStrike">
               <a:solidFill>
                 <a:srgbClr val="000000"/>
               </a:solidFill>
@@ -3069,7 +3085,8 @@
         <p:txBody>
           <a:bodyPr lIns="0" rIns="0" tIns="0" bIns="0" anchor="ctr"/>
           <a:p>
-            <a:endParaRPr b="0" lang="en-US" sz="1800" spc="-1" strike="noStrike">
+            <a:pPr algn="ctr"/>
+            <a:endParaRPr b="0" lang="en-US" sz="4400" spc="-1" strike="noStrike">
               <a:solidFill>
                 <a:srgbClr val="000000"/>
               </a:solidFill>
@@ -3186,7 +3203,8 @@
         <p:txBody>
           <a:bodyPr lIns="0" rIns="0" tIns="0" bIns="0" anchor="ctr"/>
           <a:p>
-            <a:endParaRPr b="0" lang="en-US" sz="1800" spc="-1" strike="noStrike">
+            <a:pPr algn="ctr"/>
+            <a:endParaRPr b="0" lang="en-US" sz="4400" spc="-1" strike="noStrike">
               <a:solidFill>
                 <a:srgbClr val="000000"/>
               </a:solidFill>
@@ -3224,7 +3242,7 @@
             <a:normAutofit/>
           </a:bodyPr>
           <a:p>
-            <a:endParaRPr b="0" lang="en-US" sz="1800" spc="-1" strike="noStrike">
+            <a:endParaRPr b="0" lang="en-US" sz="3200" spc="-1" strike="noStrike">
               <a:solidFill>
                 <a:srgbClr val="000000"/>
               </a:solidFill>
@@ -3262,7 +3280,7 @@
             <a:normAutofit/>
           </a:bodyPr>
           <a:p>
-            <a:endParaRPr b="0" lang="en-US" sz="1800" spc="-1" strike="noStrike">
+            <a:endParaRPr b="0" lang="en-US" sz="3200" spc="-1" strike="noStrike">
               <a:solidFill>
                 <a:srgbClr val="000000"/>
               </a:solidFill>
@@ -3300,7 +3318,7 @@
             <a:normAutofit/>
           </a:bodyPr>
           <a:p>
-            <a:endParaRPr b="0" lang="en-US" sz="1800" spc="-1" strike="noStrike">
+            <a:endParaRPr b="0" lang="en-US" sz="3200" spc="-1" strike="noStrike">
               <a:solidFill>
                 <a:srgbClr val="000000"/>
               </a:solidFill>
@@ -3358,7 +3376,8 @@
         <p:txBody>
           <a:bodyPr lIns="0" rIns="0" tIns="0" bIns="0" anchor="ctr"/>
           <a:p>
-            <a:endParaRPr b="0" lang="en-US" sz="1800" spc="-1" strike="noStrike">
+            <a:pPr algn="ctr"/>
+            <a:endParaRPr b="0" lang="en-US" sz="4400" spc="-1" strike="noStrike">
               <a:solidFill>
                 <a:srgbClr val="000000"/>
               </a:solidFill>
@@ -3396,7 +3415,7 @@
             <a:normAutofit/>
           </a:bodyPr>
           <a:p>
-            <a:endParaRPr b="0" lang="en-US" sz="1800" spc="-1" strike="noStrike">
+            <a:endParaRPr b="0" lang="en-US" sz="3200" spc="-1" strike="noStrike">
               <a:solidFill>
                 <a:srgbClr val="000000"/>
               </a:solidFill>
@@ -3434,7 +3453,7 @@
             <a:normAutofit/>
           </a:bodyPr>
           <a:p>
-            <a:endParaRPr b="0" lang="en-US" sz="1800" spc="-1" strike="noStrike">
+            <a:endParaRPr b="0" lang="en-US" sz="3200" spc="-1" strike="noStrike">
               <a:solidFill>
                 <a:srgbClr val="000000"/>
               </a:solidFill>
@@ -3472,7 +3491,7 @@
             <a:normAutofit/>
           </a:bodyPr>
           <a:p>
-            <a:endParaRPr b="0" lang="en-US" sz="1800" spc="-1" strike="noStrike">
+            <a:endParaRPr b="0" lang="en-US" sz="3200" spc="-1" strike="noStrike">
               <a:solidFill>
                 <a:srgbClr val="000000"/>
               </a:solidFill>
@@ -3530,7 +3549,8 @@
         <p:txBody>
           <a:bodyPr lIns="0" rIns="0" tIns="0" bIns="0" anchor="ctr"/>
           <a:p>
-            <a:endParaRPr b="0" lang="en-US" sz="1800" spc="-1" strike="noStrike">
+            <a:pPr algn="ctr"/>
+            <a:endParaRPr b="0" lang="en-US" sz="4400" spc="-1" strike="noStrike">
               <a:solidFill>
                 <a:srgbClr val="000000"/>
               </a:solidFill>
@@ -3568,7 +3588,7 @@
             <a:normAutofit/>
           </a:bodyPr>
           <a:p>
-            <a:endParaRPr b="0" lang="en-US" sz="1800" spc="-1" strike="noStrike">
+            <a:endParaRPr b="0" lang="en-US" sz="3200" spc="-1" strike="noStrike">
               <a:solidFill>
                 <a:srgbClr val="000000"/>
               </a:solidFill>
@@ -3606,7 +3626,7 @@
             <a:normAutofit/>
           </a:bodyPr>
           <a:p>
-            <a:endParaRPr b="0" lang="en-US" sz="1800" spc="-1" strike="noStrike">
+            <a:endParaRPr b="0" lang="en-US" sz="3200" spc="-1" strike="noStrike">
               <a:solidFill>
                 <a:srgbClr val="000000"/>
               </a:solidFill>
@@ -3644,7 +3664,7 @@
             <a:normAutofit/>
           </a:bodyPr>
           <a:p>
-            <a:endParaRPr b="0" lang="en-US" sz="1800" spc="-1" strike="noStrike">
+            <a:endParaRPr b="0" lang="en-US" sz="3200" spc="-1" strike="noStrike">
               <a:solidFill>
                 <a:srgbClr val="000000"/>
               </a:solidFill>
@@ -3709,8 +3729,9 @@
         <p:txBody>
           <a:bodyPr lIns="0" rIns="0" tIns="0" bIns="0" anchor="ctr"/>
           <a:p>
-            <a:r>
-              <a:rPr b="0" lang="en-US" sz="1800" spc="-1" strike="noStrike">
+            <a:pPr algn="ctr"/>
+            <a:r>
+              <a:rPr b="0" lang="en-US" sz="4400" spc="-1" strike="noStrike">
                 <a:solidFill>
                   <a:srgbClr val="000000"/>
                 </a:solidFill>
@@ -3723,7 +3744,7 @@
               </a:rPr>
               <a:t>Click to edit the title text format</a:t>
             </a:r>
-            <a:endParaRPr b="0" lang="en-US" sz="1800" spc="-1" strike="noStrike">
+            <a:endParaRPr b="0" lang="en-US" sz="4400" spc="-1" strike="noStrike">
               <a:solidFill>
                 <a:srgbClr val="000000"/>
               </a:solidFill>
@@ -3773,7 +3794,7 @@
               <a:buChar char=""/>
             </a:pPr>
             <a:r>
-              <a:rPr b="0" lang="en-US" sz="1800" spc="-1" strike="noStrike">
+              <a:rPr b="0" lang="en-US" sz="3200" spc="-1" strike="noStrike">
                 <a:solidFill>
                   <a:srgbClr val="000000"/>
                 </a:solidFill>
@@ -3786,7 +3807,7 @@
               </a:rPr>
               <a:t>Click to edit the outline text format</a:t>
             </a:r>
-            <a:endParaRPr b="0" lang="en-US" sz="1800" spc="-1" strike="noStrike">
+            <a:endParaRPr b="0" lang="en-US" sz="3200" spc="-1" strike="noStrike">
               <a:solidFill>
                 <a:srgbClr val="000000"/>
               </a:solidFill>
@@ -3811,7 +3832,7 @@
               <a:buChar char=""/>
             </a:pPr>
             <a:r>
-              <a:rPr b="0" lang="en-US" sz="1800" spc="-1" strike="noStrike">
+              <a:rPr b="0" lang="en-US" sz="2800" spc="-1" strike="noStrike">
                 <a:solidFill>
                   <a:srgbClr val="000000"/>
                 </a:solidFill>
@@ -3824,7 +3845,7 @@
               </a:rPr>
               <a:t>Second Outline Level</a:t>
             </a:r>
-            <a:endParaRPr b="0" lang="en-US" sz="1800" spc="-1" strike="noStrike">
+            <a:endParaRPr b="0" lang="en-US" sz="2800" spc="-1" strike="noStrike">
               <a:solidFill>
                 <a:srgbClr val="000000"/>
               </a:solidFill>
@@ -3849,7 +3870,7 @@
               <a:buChar char=""/>
             </a:pPr>
             <a:r>
-              <a:rPr b="0" lang="en-US" sz="1800" spc="-1" strike="noStrike">
+              <a:rPr b="0" lang="en-US" sz="2400" spc="-1" strike="noStrike">
                 <a:solidFill>
                   <a:srgbClr val="000000"/>
                 </a:solidFill>
@@ -3862,7 +3883,7 @@
               </a:rPr>
               <a:t>Third Outline Level</a:t>
             </a:r>
-            <a:endParaRPr b="0" lang="en-US" sz="1800" spc="-1" strike="noStrike">
+            <a:endParaRPr b="0" lang="en-US" sz="2400" spc="-1" strike="noStrike">
               <a:solidFill>
                 <a:srgbClr val="000000"/>
               </a:solidFill>
@@ -3887,7 +3908,7 @@
               <a:buChar char=""/>
             </a:pPr>
             <a:r>
-              <a:rPr b="0" lang="en-US" sz="1800" spc="-1" strike="noStrike">
+              <a:rPr b="0" lang="en-US" sz="2000" spc="-1" strike="noStrike">
                 <a:solidFill>
                   <a:srgbClr val="000000"/>
                 </a:solidFill>
@@ -3900,7 +3921,7 @@
               </a:rPr>
               <a:t>Fourth Outline Level</a:t>
             </a:r>
-            <a:endParaRPr b="0" lang="en-US" sz="1800" spc="-1" strike="noStrike">
+            <a:endParaRPr b="0" lang="en-US" sz="2000" spc="-1" strike="noStrike">
               <a:solidFill>
                 <a:srgbClr val="000000"/>
               </a:solidFill>
@@ -4094,8 +4115,9 @@
         <p:txBody>
           <a:bodyPr lIns="0" rIns="0" tIns="0" bIns="0" anchor="ctr"/>
           <a:p>
-            <a:r>
-              <a:rPr b="0" lang="en-US" sz="1800" spc="-1" strike="noStrike">
+            <a:pPr algn="ctr"/>
+            <a:r>
+              <a:rPr b="0" lang="en-US" sz="4400" spc="-1" strike="noStrike">
                 <a:solidFill>
                   <a:srgbClr val="000000"/>
                 </a:solidFill>
@@ -4108,7 +4130,7 @@
               </a:rPr>
               <a:t>Click to edit the title text format</a:t>
             </a:r>
-            <a:endParaRPr b="0" lang="en-US" sz="1800" spc="-1" strike="noStrike">
+            <a:endParaRPr b="0" lang="en-US" sz="4400" spc="-1" strike="noStrike">
               <a:solidFill>
                 <a:srgbClr val="000000"/>
               </a:solidFill>
@@ -4158,7 +4180,7 @@
               <a:buChar char=""/>
             </a:pPr>
             <a:r>
-              <a:rPr b="0" lang="en-US" sz="1800" spc="-1" strike="noStrike">
+              <a:rPr b="0" lang="en-US" sz="3200" spc="-1" strike="noStrike">
                 <a:solidFill>
                   <a:srgbClr val="000000"/>
                 </a:solidFill>
@@ -4171,7 +4193,7 @@
               </a:rPr>
               <a:t>Click to edit the outline text format</a:t>
             </a:r>
-            <a:endParaRPr b="0" lang="en-US" sz="1800" spc="-1" strike="noStrike">
+            <a:endParaRPr b="0" lang="en-US" sz="3200" spc="-1" strike="noStrike">
               <a:solidFill>
                 <a:srgbClr val="000000"/>
               </a:solidFill>
@@ -4196,7 +4218,7 @@
               <a:buChar char=""/>
             </a:pPr>
             <a:r>
-              <a:rPr b="0" lang="en-US" sz="1800" spc="-1" strike="noStrike">
+              <a:rPr b="0" lang="en-US" sz="2800" spc="-1" strike="noStrike">
                 <a:solidFill>
                   <a:srgbClr val="000000"/>
                 </a:solidFill>
@@ -4209,7 +4231,7 @@
               </a:rPr>
               <a:t>Second Outline Level</a:t>
             </a:r>
-            <a:endParaRPr b="0" lang="en-US" sz="1800" spc="-1" strike="noStrike">
+            <a:endParaRPr b="0" lang="en-US" sz="2800" spc="-1" strike="noStrike">
               <a:solidFill>
                 <a:srgbClr val="000000"/>
               </a:solidFill>
@@ -4234,7 +4256,7 @@
               <a:buChar char=""/>
             </a:pPr>
             <a:r>
-              <a:rPr b="0" lang="en-US" sz="1800" spc="-1" strike="noStrike">
+              <a:rPr b="0" lang="en-US" sz="2400" spc="-1" strike="noStrike">
                 <a:solidFill>
                   <a:srgbClr val="000000"/>
                 </a:solidFill>
@@ -4247,7 +4269,7 @@
               </a:rPr>
               <a:t>Third Outline Level</a:t>
             </a:r>
-            <a:endParaRPr b="0" lang="en-US" sz="1800" spc="-1" strike="noStrike">
+            <a:endParaRPr b="0" lang="en-US" sz="2400" spc="-1" strike="noStrike">
               <a:solidFill>
                 <a:srgbClr val="000000"/>
               </a:solidFill>
@@ -4272,7 +4294,7 @@
               <a:buChar char=""/>
             </a:pPr>
             <a:r>
-              <a:rPr b="0" lang="en-US" sz="1800" spc="-1" strike="noStrike">
+              <a:rPr b="0" lang="en-US" sz="2000" spc="-1" strike="noStrike">
                 <a:solidFill>
                   <a:srgbClr val="000000"/>
                 </a:solidFill>
@@ -4285,7 +4307,7 @@
               </a:rPr>
               <a:t>Fourth Outline Level</a:t>
             </a:r>
-            <a:endParaRPr b="0" lang="en-US" sz="1800" spc="-1" strike="noStrike">
+            <a:endParaRPr b="0" lang="en-US" sz="2000" spc="-1" strike="noStrike">
               <a:solidFill>
                 <a:srgbClr val="000000"/>
               </a:solidFill>
@@ -4458,8 +4480,8 @@
         </p:nvSpPr>
         <p:spPr>
           <a:xfrm rot="5400000">
-            <a:off x="3912120" y="2349360"/>
-            <a:ext cx="2089800" cy="1734120"/>
+            <a:off x="3912480" y="2349360"/>
+            <a:ext cx="2089440" cy="1733760"/>
           </a:xfrm>
           <a:prstGeom prst="rect">
             <a:avLst/>
@@ -4753,7 +4775,7 @@
         <p:spPr>
           <a:xfrm>
             <a:off x="3855600" y="336600"/>
-            <a:ext cx="1252080" cy="362520"/>
+            <a:ext cx="1251720" cy="362160"/>
           </a:xfrm>
           <a:prstGeom prst="rect">
             <a:avLst/>
@@ -5001,7 +5023,7 @@
         <p:spPr>
           <a:xfrm>
             <a:off x="7938720" y="1004400"/>
-            <a:ext cx="1389960" cy="362520"/>
+            <a:ext cx="1389600" cy="362160"/>
           </a:xfrm>
           <a:prstGeom prst="rect">
             <a:avLst/>
@@ -5063,7 +5085,7 @@
         <p:spPr>
           <a:xfrm>
             <a:off x="2064960" y="961560"/>
-            <a:ext cx="1389960" cy="362520"/>
+            <a:ext cx="1389600" cy="362160"/>
           </a:xfrm>
           <a:prstGeom prst="rect">
             <a:avLst/>
@@ -5125,7 +5147,7 @@
         <p:spPr>
           <a:xfrm>
             <a:off x="3227760" y="992160"/>
-            <a:ext cx="1389960" cy="362520"/>
+            <a:ext cx="1389600" cy="362160"/>
           </a:xfrm>
           <a:prstGeom prst="rect">
             <a:avLst/>
@@ -5187,7 +5209,7 @@
         <p:spPr>
           <a:xfrm>
             <a:off x="4584240" y="989280"/>
-            <a:ext cx="1389960" cy="362520"/>
+            <a:ext cx="1389600" cy="362160"/>
           </a:xfrm>
           <a:prstGeom prst="rect">
             <a:avLst/>
@@ -5249,7 +5271,7 @@
         <p:spPr>
           <a:xfrm>
             <a:off x="5659560" y="992160"/>
-            <a:ext cx="1389960" cy="362520"/>
+            <a:ext cx="1389600" cy="362160"/>
           </a:xfrm>
           <a:prstGeom prst="rect">
             <a:avLst/>
@@ -5311,7 +5333,7 @@
         <p:spPr>
           <a:xfrm>
             <a:off x="6624000" y="1005480"/>
-            <a:ext cx="1389960" cy="362520"/>
+            <a:ext cx="1389600" cy="362160"/>
           </a:xfrm>
           <a:prstGeom prst="rect">
             <a:avLst/>
@@ -5373,7 +5395,7 @@
         <p:spPr>
           <a:xfrm>
             <a:off x="550080" y="973800"/>
-            <a:ext cx="1389960" cy="362520"/>
+            <a:ext cx="1389600" cy="362160"/>
           </a:xfrm>
           <a:prstGeom prst="rect">
             <a:avLst/>
@@ -5466,7 +5488,7 @@
         <p:spPr>
           <a:xfrm>
             <a:off x="183600" y="1422720"/>
-            <a:ext cx="1649160" cy="362520"/>
+            <a:ext cx="1648800" cy="362160"/>
           </a:xfrm>
           <a:prstGeom prst="rect">
             <a:avLst/>
@@ -5528,7 +5550,7 @@
         <p:spPr>
           <a:xfrm>
             <a:off x="2373840" y="1530000"/>
-            <a:ext cx="294840" cy="362520"/>
+            <a:ext cx="294480" cy="362160"/>
           </a:xfrm>
           <a:prstGeom prst="rect">
             <a:avLst/>
@@ -5590,7 +5612,7 @@
         <p:spPr>
           <a:xfrm>
             <a:off x="3248640" y="1545120"/>
-            <a:ext cx="948600" cy="362520"/>
+            <a:ext cx="948240" cy="362160"/>
           </a:xfrm>
           <a:prstGeom prst="rect">
             <a:avLst/>
@@ -5652,7 +5674,7 @@
         <p:spPr>
           <a:xfrm>
             <a:off x="4683960" y="1530000"/>
-            <a:ext cx="294840" cy="362520"/>
+            <a:ext cx="294480" cy="362160"/>
           </a:xfrm>
           <a:prstGeom prst="rect">
             <a:avLst/>
@@ -5714,7 +5736,7 @@
         <p:spPr>
           <a:xfrm>
             <a:off x="5779080" y="1529640"/>
-            <a:ext cx="526320" cy="362520"/>
+            <a:ext cx="525960" cy="362160"/>
           </a:xfrm>
           <a:prstGeom prst="rect">
             <a:avLst/>
@@ -5776,7 +5798,7 @@
         <p:spPr>
           <a:xfrm>
             <a:off x="6783120" y="1530000"/>
-            <a:ext cx="633240" cy="362520"/>
+            <a:ext cx="632880" cy="362160"/>
           </a:xfrm>
           <a:prstGeom prst="rect">
             <a:avLst/>
@@ -5838,7 +5860,7 @@
         <p:spPr>
           <a:xfrm>
             <a:off x="8213760" y="1545120"/>
-            <a:ext cx="477720" cy="362520"/>
+            <a:ext cx="477360" cy="362160"/>
           </a:xfrm>
           <a:prstGeom prst="rect">
             <a:avLst/>
@@ -6055,7 +6077,7 @@
         <p:spPr>
           <a:xfrm>
             <a:off x="106920" y="91800"/>
-            <a:ext cx="1741320" cy="727560"/>
+            <a:ext cx="1740960" cy="727200"/>
           </a:xfrm>
           <a:prstGeom prst="rect">
             <a:avLst/>
@@ -6158,6 +6180,39 @@
                 <a:latin typeface="Calibri"/>
                 <a:ea typeface="DejaVu Sans"/>
               </a:rPr>
+              <a:t>Tim Curry</a:t>
+            </a:r>
+            <a:endParaRPr b="0" lang="en-US" sz="1400" spc="-1" strike="noStrike">
+              <a:solidFill>
+                <a:srgbClr val="000000"/>
+              </a:solidFill>
+              <a:uFill>
+                <a:solidFill>
+                  <a:srgbClr val="ffffff"/>
+                </a:solidFill>
+              </a:uFill>
+              <a:latin typeface="Arial"/>
+            </a:endParaRPr>
+          </a:p>
+          <a:p>
+            <a:pPr>
+              <a:lnSpc>
+                <a:spcPct val="100000"/>
+              </a:lnSpc>
+            </a:pPr>
+            <a:r>
+              <a:rPr b="0" lang="en-US" sz="1400" spc="-1" strike="noStrike">
+                <a:solidFill>
+                  <a:srgbClr val="000000"/>
+                </a:solidFill>
+                <a:uFill>
+                  <a:solidFill>
+                    <a:srgbClr val="ffffff"/>
+                  </a:solidFill>
+                </a:uFill>
+                <a:latin typeface="Calibri"/>
+                <a:ea typeface="DejaVu Sans"/>
+              </a:rPr>
               <a:t>CS 4900</a:t>
             </a:r>
             <a:endParaRPr b="0" lang="en-US" sz="1400" spc="-1" strike="noStrike">
@@ -6183,7 +6238,7 @@
         <p:spPr>
           <a:xfrm>
             <a:off x="8292600" y="91800"/>
-            <a:ext cx="788400" cy="362520"/>
+            <a:ext cx="788040" cy="362160"/>
           </a:xfrm>
           <a:prstGeom prst="rect">
             <a:avLst/>
@@ -6245,7 +6300,7 @@
         <p:spPr>
           <a:xfrm>
             <a:off x="3715560" y="565920"/>
-            <a:ext cx="1672560" cy="362520"/>
+            <a:ext cx="1672200" cy="362160"/>
           </a:xfrm>
           <a:prstGeom prst="rect">
             <a:avLst/>
@@ -6307,7 +6362,7 @@
         <p:spPr>
           <a:xfrm>
             <a:off x="183600" y="2157840"/>
-            <a:ext cx="1649160" cy="362520"/>
+            <a:ext cx="1648800" cy="362160"/>
           </a:xfrm>
           <a:prstGeom prst="rect">
             <a:avLst/>
@@ -6369,7 +6424,7 @@
         <p:spPr>
           <a:xfrm>
             <a:off x="2373840" y="2265120"/>
-            <a:ext cx="294840" cy="362520"/>
+            <a:ext cx="294480" cy="362160"/>
           </a:xfrm>
           <a:prstGeom prst="rect">
             <a:avLst/>
@@ -6431,7 +6486,7 @@
         <p:spPr>
           <a:xfrm>
             <a:off x="3248640" y="2280240"/>
-            <a:ext cx="948600" cy="362520"/>
+            <a:ext cx="948240" cy="362160"/>
           </a:xfrm>
           <a:prstGeom prst="rect">
             <a:avLst/>
@@ -6493,7 +6548,7 @@
         <p:spPr>
           <a:xfrm>
             <a:off x="4683960" y="2265120"/>
-            <a:ext cx="294840" cy="362520"/>
+            <a:ext cx="294480" cy="362160"/>
           </a:xfrm>
           <a:prstGeom prst="rect">
             <a:avLst/>
@@ -6555,7 +6610,7 @@
         <p:spPr>
           <a:xfrm>
             <a:off x="5779080" y="2264760"/>
-            <a:ext cx="526320" cy="362520"/>
+            <a:ext cx="525960" cy="362160"/>
           </a:xfrm>
           <a:prstGeom prst="rect">
             <a:avLst/>
@@ -6617,7 +6672,7 @@
         <p:spPr>
           <a:xfrm>
             <a:off x="6783120" y="2265120"/>
-            <a:ext cx="633240" cy="362520"/>
+            <a:ext cx="632880" cy="362160"/>
           </a:xfrm>
           <a:prstGeom prst="rect">
             <a:avLst/>
@@ -6679,7 +6734,7 @@
         <p:spPr>
           <a:xfrm>
             <a:off x="8213760" y="2280240"/>
-            <a:ext cx="477720" cy="362520"/>
+            <a:ext cx="477360" cy="362160"/>
           </a:xfrm>
           <a:prstGeom prst="rect">
             <a:avLst/>
@@ -6741,7 +6796,7 @@
         <p:spPr>
           <a:xfrm>
             <a:off x="108000" y="2892240"/>
-            <a:ext cx="2010600" cy="362520"/>
+            <a:ext cx="2010240" cy="362160"/>
           </a:xfrm>
           <a:prstGeom prst="rect">
             <a:avLst/>
@@ -6803,7 +6858,7 @@
         <p:spPr>
           <a:xfrm>
             <a:off x="2373840" y="2999520"/>
-            <a:ext cx="294840" cy="362520"/>
+            <a:ext cx="294480" cy="362160"/>
           </a:xfrm>
           <a:prstGeom prst="rect">
             <a:avLst/>
@@ -6865,7 +6920,7 @@
         <p:spPr>
           <a:xfrm>
             <a:off x="3248640" y="3014640"/>
-            <a:ext cx="948600" cy="362520"/>
+            <a:ext cx="948240" cy="362160"/>
           </a:xfrm>
           <a:prstGeom prst="rect">
             <a:avLst/>
@@ -6927,7 +6982,7 @@
         <p:spPr>
           <a:xfrm>
             <a:off x="4683960" y="2999520"/>
-            <a:ext cx="294840" cy="362520"/>
+            <a:ext cx="294480" cy="362160"/>
           </a:xfrm>
           <a:prstGeom prst="rect">
             <a:avLst/>
@@ -6989,7 +7044,7 @@
         <p:spPr>
           <a:xfrm>
             <a:off x="5779080" y="2999160"/>
-            <a:ext cx="526320" cy="362520"/>
+            <a:ext cx="525960" cy="362160"/>
           </a:xfrm>
           <a:prstGeom prst="rect">
             <a:avLst/>
@@ -7051,7 +7106,7 @@
         <p:spPr>
           <a:xfrm>
             <a:off x="6783120" y="2999520"/>
-            <a:ext cx="633240" cy="362520"/>
+            <a:ext cx="632880" cy="362160"/>
           </a:xfrm>
           <a:prstGeom prst="rect">
             <a:avLst/>
@@ -7113,7 +7168,7 @@
         <p:spPr>
           <a:xfrm>
             <a:off x="8213760" y="3014640"/>
-            <a:ext cx="477720" cy="362520"/>
+            <a:ext cx="477360" cy="362160"/>
           </a:xfrm>
           <a:prstGeom prst="rect">
             <a:avLst/>
@@ -7175,7 +7230,7 @@
         <p:spPr>
           <a:xfrm>
             <a:off x="108000" y="3733560"/>
-            <a:ext cx="2010600" cy="362520"/>
+            <a:ext cx="2010240" cy="362160"/>
           </a:xfrm>
           <a:prstGeom prst="rect">
             <a:avLst/>
@@ -7237,7 +7292,7 @@
         <p:spPr>
           <a:xfrm>
             <a:off x="2373840" y="3840840"/>
-            <a:ext cx="294840" cy="362520"/>
+            <a:ext cx="294480" cy="362160"/>
           </a:xfrm>
           <a:prstGeom prst="rect">
             <a:avLst/>
@@ -7299,7 +7354,7 @@
         <p:spPr>
           <a:xfrm>
             <a:off x="3248640" y="3855960"/>
-            <a:ext cx="948600" cy="362520"/>
+            <a:ext cx="948240" cy="362160"/>
           </a:xfrm>
           <a:prstGeom prst="rect">
             <a:avLst/>
@@ -7361,7 +7416,7 @@
         <p:spPr>
           <a:xfrm>
             <a:off x="4683960" y="3840840"/>
-            <a:ext cx="294840" cy="362520"/>
+            <a:ext cx="294480" cy="362160"/>
           </a:xfrm>
           <a:prstGeom prst="rect">
             <a:avLst/>
@@ -7423,7 +7478,7 @@
         <p:spPr>
           <a:xfrm>
             <a:off x="5779080" y="3840480"/>
-            <a:ext cx="526320" cy="362520"/>
+            <a:ext cx="525960" cy="362160"/>
           </a:xfrm>
           <a:prstGeom prst="rect">
             <a:avLst/>
@@ -7485,7 +7540,7 @@
         <p:spPr>
           <a:xfrm>
             <a:off x="6783120" y="3840840"/>
-            <a:ext cx="633240" cy="362520"/>
+            <a:ext cx="632880" cy="362160"/>
           </a:xfrm>
           <a:prstGeom prst="rect">
             <a:avLst/>
@@ -7547,7 +7602,7 @@
         <p:spPr>
           <a:xfrm>
             <a:off x="8213760" y="3855960"/>
-            <a:ext cx="477720" cy="362520"/>
+            <a:ext cx="477360" cy="362160"/>
           </a:xfrm>
           <a:prstGeom prst="rect">
             <a:avLst/>
@@ -7609,7 +7664,7 @@
         <p:spPr>
           <a:xfrm>
             <a:off x="108000" y="4525560"/>
-            <a:ext cx="2010600" cy="362520"/>
+            <a:ext cx="2010240" cy="362160"/>
           </a:xfrm>
           <a:prstGeom prst="rect">
             <a:avLst/>
@@ -7671,7 +7726,7 @@
         <p:spPr>
           <a:xfrm>
             <a:off x="2373840" y="4632840"/>
-            <a:ext cx="294840" cy="362520"/>
+            <a:ext cx="294480" cy="362160"/>
           </a:xfrm>
           <a:prstGeom prst="rect">
             <a:avLst/>
@@ -7733,7 +7788,7 @@
         <p:spPr>
           <a:xfrm>
             <a:off x="3248640" y="4647960"/>
-            <a:ext cx="948600" cy="362520"/>
+            <a:ext cx="948240" cy="362160"/>
           </a:xfrm>
           <a:prstGeom prst="rect">
             <a:avLst/>
@@ -7795,7 +7850,7 @@
         <p:spPr>
           <a:xfrm>
             <a:off x="4683960" y="4632840"/>
-            <a:ext cx="294840" cy="362520"/>
+            <a:ext cx="294480" cy="362160"/>
           </a:xfrm>
           <a:prstGeom prst="rect">
             <a:avLst/>
@@ -7857,7 +7912,7 @@
         <p:spPr>
           <a:xfrm>
             <a:off x="5779080" y="4632480"/>
-            <a:ext cx="526320" cy="362520"/>
+            <a:ext cx="525960" cy="362160"/>
           </a:xfrm>
           <a:prstGeom prst="rect">
             <a:avLst/>
@@ -7919,7 +7974,7 @@
         <p:spPr>
           <a:xfrm>
             <a:off x="6783120" y="4632840"/>
-            <a:ext cx="633240" cy="362520"/>
+            <a:ext cx="632880" cy="362160"/>
           </a:xfrm>
           <a:prstGeom prst="rect">
             <a:avLst/>
@@ -7981,7 +8036,7 @@
         <p:spPr>
           <a:xfrm>
             <a:off x="8213760" y="4647960"/>
-            <a:ext cx="477720" cy="362520"/>
+            <a:ext cx="477360" cy="362160"/>
           </a:xfrm>
           <a:prstGeom prst="rect">
             <a:avLst/>
@@ -8043,7 +8098,7 @@
         <p:spPr>
           <a:xfrm>
             <a:off x="108000" y="5367240"/>
-            <a:ext cx="2010600" cy="362520"/>
+            <a:ext cx="2010240" cy="362160"/>
           </a:xfrm>
           <a:prstGeom prst="rect">
             <a:avLst/>
@@ -8105,7 +8160,7 @@
         <p:spPr>
           <a:xfrm>
             <a:off x="2373840" y="5474520"/>
-            <a:ext cx="294840" cy="362520"/>
+            <a:ext cx="294480" cy="362160"/>
           </a:xfrm>
           <a:prstGeom prst="rect">
             <a:avLst/>
@@ -8167,7 +8222,7 @@
         <p:spPr>
           <a:xfrm>
             <a:off x="3248640" y="5489640"/>
-            <a:ext cx="948600" cy="362520"/>
+            <a:ext cx="948240" cy="362160"/>
           </a:xfrm>
           <a:prstGeom prst="rect">
             <a:avLst/>
@@ -8229,7 +8284,7 @@
         <p:spPr>
           <a:xfrm>
             <a:off x="4683960" y="5474520"/>
-            <a:ext cx="294840" cy="362520"/>
+            <a:ext cx="294480" cy="362160"/>
           </a:xfrm>
           <a:prstGeom prst="rect">
             <a:avLst/>
@@ -8291,7 +8346,7 @@
         <p:spPr>
           <a:xfrm>
             <a:off x="5779080" y="5474160"/>
-            <a:ext cx="526320" cy="362520"/>
+            <a:ext cx="525960" cy="362160"/>
           </a:xfrm>
           <a:prstGeom prst="rect">
             <a:avLst/>
@@ -8353,7 +8408,7 @@
         <p:spPr>
           <a:xfrm>
             <a:off x="6783120" y="5474520"/>
-            <a:ext cx="633240" cy="362520"/>
+            <a:ext cx="632880" cy="362160"/>
           </a:xfrm>
           <a:prstGeom prst="rect">
             <a:avLst/>
@@ -8415,7 +8470,7 @@
         <p:spPr>
           <a:xfrm>
             <a:off x="8213760" y="5489640"/>
-            <a:ext cx="477720" cy="362520"/>
+            <a:ext cx="477360" cy="362160"/>
           </a:xfrm>
           <a:prstGeom prst="rect">
             <a:avLst/>
@@ -8526,7 +8581,7 @@
         <p:spPr>
           <a:xfrm>
             <a:off x="3855600" y="336600"/>
-            <a:ext cx="1252080" cy="362520"/>
+            <a:ext cx="1251720" cy="362160"/>
           </a:xfrm>
           <a:prstGeom prst="rect">
             <a:avLst/>
@@ -8774,7 +8829,7 @@
         <p:spPr>
           <a:xfrm>
             <a:off x="7938720" y="1004400"/>
-            <a:ext cx="1389960" cy="362520"/>
+            <a:ext cx="1389600" cy="362160"/>
           </a:xfrm>
           <a:prstGeom prst="rect">
             <a:avLst/>
@@ -8836,7 +8891,7 @@
         <p:spPr>
           <a:xfrm>
             <a:off x="2064960" y="961560"/>
-            <a:ext cx="1389960" cy="362520"/>
+            <a:ext cx="1389600" cy="362160"/>
           </a:xfrm>
           <a:prstGeom prst="rect">
             <a:avLst/>
@@ -8898,7 +8953,7 @@
         <p:spPr>
           <a:xfrm>
             <a:off x="3227760" y="992160"/>
-            <a:ext cx="1389960" cy="362520"/>
+            <a:ext cx="1389600" cy="362160"/>
           </a:xfrm>
           <a:prstGeom prst="rect">
             <a:avLst/>
@@ -8960,7 +9015,7 @@
         <p:spPr>
           <a:xfrm>
             <a:off x="4584240" y="989280"/>
-            <a:ext cx="1389960" cy="362520"/>
+            <a:ext cx="1389600" cy="362160"/>
           </a:xfrm>
           <a:prstGeom prst="rect">
             <a:avLst/>
@@ -9022,7 +9077,7 @@
         <p:spPr>
           <a:xfrm>
             <a:off x="5659560" y="992160"/>
-            <a:ext cx="1389960" cy="362520"/>
+            <a:ext cx="1389600" cy="362160"/>
           </a:xfrm>
           <a:prstGeom prst="rect">
             <a:avLst/>
@@ -9084,7 +9139,7 @@
         <p:spPr>
           <a:xfrm>
             <a:off x="6624000" y="1005480"/>
-            <a:ext cx="1389960" cy="362520"/>
+            <a:ext cx="1389600" cy="362160"/>
           </a:xfrm>
           <a:prstGeom prst="rect">
             <a:avLst/>
@@ -9146,7 +9201,7 @@
         <p:spPr>
           <a:xfrm>
             <a:off x="550080" y="973800"/>
-            <a:ext cx="1389960" cy="362520"/>
+            <a:ext cx="1389600" cy="362160"/>
           </a:xfrm>
           <a:prstGeom prst="rect">
             <a:avLst/>
@@ -9239,7 +9294,7 @@
         <p:spPr>
           <a:xfrm>
             <a:off x="183600" y="1422720"/>
-            <a:ext cx="1649160" cy="362520"/>
+            <a:ext cx="1648800" cy="362160"/>
           </a:xfrm>
           <a:prstGeom prst="rect">
             <a:avLst/>
@@ -9301,7 +9356,7 @@
         <p:spPr>
           <a:xfrm>
             <a:off x="2373840" y="1530000"/>
-            <a:ext cx="294840" cy="362520"/>
+            <a:ext cx="294480" cy="362160"/>
           </a:xfrm>
           <a:prstGeom prst="rect">
             <a:avLst/>
@@ -9363,7 +9418,7 @@
         <p:spPr>
           <a:xfrm>
             <a:off x="3248640" y="1545120"/>
-            <a:ext cx="948600" cy="362520"/>
+            <a:ext cx="948240" cy="362160"/>
           </a:xfrm>
           <a:prstGeom prst="rect">
             <a:avLst/>
@@ -9425,7 +9480,7 @@
         <p:spPr>
           <a:xfrm>
             <a:off x="4683960" y="1530000"/>
-            <a:ext cx="294840" cy="362520"/>
+            <a:ext cx="294480" cy="362160"/>
           </a:xfrm>
           <a:prstGeom prst="rect">
             <a:avLst/>
@@ -9487,7 +9542,7 @@
         <p:spPr>
           <a:xfrm>
             <a:off x="5779080" y="1529640"/>
-            <a:ext cx="526320" cy="362520"/>
+            <a:ext cx="525960" cy="362160"/>
           </a:xfrm>
           <a:prstGeom prst="rect">
             <a:avLst/>
@@ -9549,7 +9604,7 @@
         <p:spPr>
           <a:xfrm>
             <a:off x="6783120" y="1530000"/>
-            <a:ext cx="633240" cy="362520"/>
+            <a:ext cx="632880" cy="362160"/>
           </a:xfrm>
           <a:prstGeom prst="rect">
             <a:avLst/>
@@ -9611,7 +9666,7 @@
         <p:spPr>
           <a:xfrm>
             <a:off x="8213760" y="1545120"/>
-            <a:ext cx="477720" cy="362520"/>
+            <a:ext cx="477360" cy="362160"/>
           </a:xfrm>
           <a:prstGeom prst="rect">
             <a:avLst/>
@@ -9704,7 +9759,7 @@
         <p:spPr>
           <a:xfrm>
             <a:off x="106920" y="91800"/>
-            <a:ext cx="1741320" cy="727560"/>
+            <a:ext cx="1740960" cy="727200"/>
           </a:xfrm>
           <a:prstGeom prst="rect">
             <a:avLst/>
@@ -9807,6 +9862,39 @@
                 <a:latin typeface="Calibri"/>
                 <a:ea typeface="DejaVu Sans"/>
               </a:rPr>
+              <a:t>Tim Curry</a:t>
+            </a:r>
+            <a:endParaRPr b="0" lang="en-US" sz="1400" spc="-1" strike="noStrike">
+              <a:solidFill>
+                <a:srgbClr val="000000"/>
+              </a:solidFill>
+              <a:uFill>
+                <a:solidFill>
+                  <a:srgbClr val="ffffff"/>
+                </a:solidFill>
+              </a:uFill>
+              <a:latin typeface="Arial"/>
+            </a:endParaRPr>
+          </a:p>
+          <a:p>
+            <a:pPr>
+              <a:lnSpc>
+                <a:spcPct val="100000"/>
+              </a:lnSpc>
+            </a:pPr>
+            <a:r>
+              <a:rPr b="0" lang="en-US" sz="1400" spc="-1" strike="noStrike">
+                <a:solidFill>
+                  <a:srgbClr val="000000"/>
+                </a:solidFill>
+                <a:uFill>
+                  <a:solidFill>
+                    <a:srgbClr val="ffffff"/>
+                  </a:solidFill>
+                </a:uFill>
+                <a:latin typeface="Calibri"/>
+                <a:ea typeface="DejaVu Sans"/>
+              </a:rPr>
               <a:t>CS 4900</a:t>
             </a:r>
             <a:endParaRPr b="0" lang="en-US" sz="1400" spc="-1" strike="noStrike">
@@ -9832,7 +9920,7 @@
         <p:spPr>
           <a:xfrm>
             <a:off x="8292600" y="91800"/>
-            <a:ext cx="788400" cy="362520"/>
+            <a:ext cx="788040" cy="362160"/>
           </a:xfrm>
           <a:prstGeom prst="rect">
             <a:avLst/>
@@ -9869,7 +9957,7 @@
                 <a:latin typeface="Calibri"/>
                 <a:ea typeface="DejaVu Sans"/>
               </a:rPr>
-              <a:t>Page 1</a:t>
+              <a:t>Page 2</a:t>
             </a:r>
             <a:endParaRPr b="0" lang="en-US" sz="1800" spc="-1" strike="noStrike">
               <a:solidFill>
@@ -9894,7 +9982,7 @@
         <p:spPr>
           <a:xfrm>
             <a:off x="3715560" y="565920"/>
-            <a:ext cx="1672560" cy="362520"/>
+            <a:ext cx="1672200" cy="362160"/>
           </a:xfrm>
           <a:prstGeom prst="rect">
             <a:avLst/>
@@ -9956,7 +10044,7 @@
         <p:spPr>
           <a:xfrm>
             <a:off x="213480" y="2187000"/>
-            <a:ext cx="1649160" cy="362520"/>
+            <a:ext cx="1648800" cy="362160"/>
           </a:xfrm>
           <a:prstGeom prst="rect">
             <a:avLst/>
@@ -9982,7 +10070,7 @@
         <p:spPr>
           <a:xfrm>
             <a:off x="183600" y="2159280"/>
-            <a:ext cx="2102400" cy="362520"/>
+            <a:ext cx="2102040" cy="362160"/>
           </a:xfrm>
           <a:prstGeom prst="rect">
             <a:avLst/>
@@ -10044,7 +10132,7 @@
         <p:spPr>
           <a:xfrm>
             <a:off x="2373840" y="2266560"/>
-            <a:ext cx="294840" cy="362520"/>
+            <a:ext cx="294480" cy="362160"/>
           </a:xfrm>
           <a:prstGeom prst="rect">
             <a:avLst/>
@@ -10106,7 +10194,7 @@
         <p:spPr>
           <a:xfrm>
             <a:off x="3248640" y="2281680"/>
-            <a:ext cx="948600" cy="362520"/>
+            <a:ext cx="948240" cy="362160"/>
           </a:xfrm>
           <a:prstGeom prst="rect">
             <a:avLst/>
@@ -10168,7 +10256,7 @@
         <p:spPr>
           <a:xfrm>
             <a:off x="4683960" y="2266560"/>
-            <a:ext cx="294840" cy="362520"/>
+            <a:ext cx="294480" cy="362160"/>
           </a:xfrm>
           <a:prstGeom prst="rect">
             <a:avLst/>
@@ -10230,7 +10318,7 @@
         <p:spPr>
           <a:xfrm>
             <a:off x="5779080" y="2266200"/>
-            <a:ext cx="526320" cy="362520"/>
+            <a:ext cx="525960" cy="362160"/>
           </a:xfrm>
           <a:prstGeom prst="rect">
             <a:avLst/>
@@ -10292,7 +10380,7 @@
         <p:spPr>
           <a:xfrm>
             <a:off x="6783120" y="2266560"/>
-            <a:ext cx="633240" cy="362520"/>
+            <a:ext cx="632880" cy="362160"/>
           </a:xfrm>
           <a:prstGeom prst="rect">
             <a:avLst/>
@@ -10354,7 +10442,7 @@
         <p:spPr>
           <a:xfrm>
             <a:off x="8213760" y="2281680"/>
-            <a:ext cx="477720" cy="362520"/>
+            <a:ext cx="477360" cy="362160"/>
           </a:xfrm>
           <a:prstGeom prst="rect">
             <a:avLst/>
@@ -10447,7 +10535,7 @@
         <p:spPr>
           <a:xfrm>
             <a:off x="2373840" y="2967120"/>
-            <a:ext cx="294840" cy="362520"/>
+            <a:ext cx="294480" cy="362160"/>
           </a:xfrm>
           <a:prstGeom prst="rect">
             <a:avLst/>
@@ -10509,7 +10597,7 @@
         <p:spPr>
           <a:xfrm>
             <a:off x="3248640" y="2982240"/>
-            <a:ext cx="948600" cy="362520"/>
+            <a:ext cx="948240" cy="362160"/>
           </a:xfrm>
           <a:prstGeom prst="rect">
             <a:avLst/>
@@ -10571,7 +10659,7 @@
         <p:spPr>
           <a:xfrm>
             <a:off x="4683960" y="2967120"/>
-            <a:ext cx="294840" cy="362520"/>
+            <a:ext cx="294480" cy="362160"/>
           </a:xfrm>
           <a:prstGeom prst="rect">
             <a:avLst/>
@@ -10633,7 +10721,7 @@
         <p:spPr>
           <a:xfrm>
             <a:off x="5779080" y="2966760"/>
-            <a:ext cx="526320" cy="362520"/>
+            <a:ext cx="525960" cy="362160"/>
           </a:xfrm>
           <a:prstGeom prst="rect">
             <a:avLst/>
@@ -10695,7 +10783,7 @@
         <p:spPr>
           <a:xfrm>
             <a:off x="6783120" y="2967120"/>
-            <a:ext cx="633240" cy="362520"/>
+            <a:ext cx="632880" cy="362160"/>
           </a:xfrm>
           <a:prstGeom prst="rect">
             <a:avLst/>
@@ -10757,7 +10845,7 @@
         <p:spPr>
           <a:xfrm>
             <a:off x="8213760" y="2982240"/>
-            <a:ext cx="477720" cy="362520"/>
+            <a:ext cx="477360" cy="362160"/>
           </a:xfrm>
           <a:prstGeom prst="rect">
             <a:avLst/>
@@ -10819,7 +10907,7 @@
         <p:spPr>
           <a:xfrm>
             <a:off x="183600" y="2828520"/>
-            <a:ext cx="2102400" cy="362520"/>
+            <a:ext cx="2102040" cy="362160"/>
           </a:xfrm>
           <a:prstGeom prst="rect">
             <a:avLst/>
@@ -10881,7 +10969,7 @@
         <p:spPr>
           <a:xfrm>
             <a:off x="2373840" y="4999680"/>
-            <a:ext cx="294840" cy="362520"/>
+            <a:ext cx="294480" cy="362160"/>
           </a:xfrm>
           <a:prstGeom prst="rect">
             <a:avLst/>
@@ -10943,7 +11031,7 @@
         <p:spPr>
           <a:xfrm>
             <a:off x="3248640" y="5014800"/>
-            <a:ext cx="948600" cy="362520"/>
+            <a:ext cx="948240" cy="362160"/>
           </a:xfrm>
           <a:prstGeom prst="rect">
             <a:avLst/>
@@ -11005,7 +11093,7 @@
         <p:spPr>
           <a:xfrm>
             <a:off x="4683960" y="4999680"/>
-            <a:ext cx="294840" cy="362520"/>
+            <a:ext cx="294480" cy="362160"/>
           </a:xfrm>
           <a:prstGeom prst="rect">
             <a:avLst/>
@@ -11067,7 +11155,7 @@
         <p:spPr>
           <a:xfrm>
             <a:off x="5779080" y="4999320"/>
-            <a:ext cx="526320" cy="362520"/>
+            <a:ext cx="525960" cy="362160"/>
           </a:xfrm>
           <a:prstGeom prst="rect">
             <a:avLst/>
@@ -11129,7 +11217,7 @@
         <p:spPr>
           <a:xfrm>
             <a:off x="6783120" y="4999680"/>
-            <a:ext cx="633240" cy="362520"/>
+            <a:ext cx="632880" cy="362160"/>
           </a:xfrm>
           <a:prstGeom prst="rect">
             <a:avLst/>
@@ -11191,7 +11279,7 @@
         <p:spPr>
           <a:xfrm>
             <a:off x="8213760" y="5014800"/>
-            <a:ext cx="477720" cy="362520"/>
+            <a:ext cx="477360" cy="362160"/>
           </a:xfrm>
           <a:prstGeom prst="rect">
             <a:avLst/>
@@ -11284,7 +11372,7 @@
         <p:spPr>
           <a:xfrm>
             <a:off x="39600" y="3724560"/>
-            <a:ext cx="2102400" cy="362520"/>
+            <a:ext cx="2102040" cy="362160"/>
           </a:xfrm>
           <a:prstGeom prst="rect">
             <a:avLst/>
@@ -11346,7 +11434,7 @@
         <p:spPr>
           <a:xfrm>
             <a:off x="2373840" y="5772240"/>
-            <a:ext cx="294840" cy="362520"/>
+            <a:ext cx="294480" cy="362160"/>
           </a:xfrm>
           <a:prstGeom prst="rect">
             <a:avLst/>
@@ -11408,7 +11496,7 @@
         <p:spPr>
           <a:xfrm>
             <a:off x="3248640" y="5787360"/>
-            <a:ext cx="948600" cy="362520"/>
+            <a:ext cx="948240" cy="362160"/>
           </a:xfrm>
           <a:prstGeom prst="rect">
             <a:avLst/>
@@ -11470,7 +11558,7 @@
         <p:spPr>
           <a:xfrm>
             <a:off x="4683960" y="5772240"/>
-            <a:ext cx="294840" cy="362520"/>
+            <a:ext cx="294480" cy="362160"/>
           </a:xfrm>
           <a:prstGeom prst="rect">
             <a:avLst/>
@@ -11532,7 +11620,7 @@
         <p:spPr>
           <a:xfrm>
             <a:off x="5779080" y="5771880"/>
-            <a:ext cx="526320" cy="362520"/>
+            <a:ext cx="525960" cy="362160"/>
           </a:xfrm>
           <a:prstGeom prst="rect">
             <a:avLst/>
@@ -11594,7 +11682,7 @@
         <p:spPr>
           <a:xfrm>
             <a:off x="6783120" y="5772240"/>
-            <a:ext cx="633240" cy="362520"/>
+            <a:ext cx="632880" cy="362160"/>
           </a:xfrm>
           <a:prstGeom prst="rect">
             <a:avLst/>
@@ -11656,7 +11744,7 @@
         <p:spPr>
           <a:xfrm>
             <a:off x="8213760" y="5787360"/>
-            <a:ext cx="477720" cy="362520"/>
+            <a:ext cx="477360" cy="362160"/>
           </a:xfrm>
           <a:prstGeom prst="rect">
             <a:avLst/>
@@ -11749,7 +11837,7 @@
         <p:spPr>
           <a:xfrm>
             <a:off x="39600" y="5556600"/>
-            <a:ext cx="2102400" cy="362520"/>
+            <a:ext cx="2102040" cy="362160"/>
           </a:xfrm>
           <a:prstGeom prst="rect">
             <a:avLst/>
@@ -11811,7 +11899,7 @@
         <p:spPr>
           <a:xfrm>
             <a:off x="39600" y="4548600"/>
-            <a:ext cx="2102400" cy="362520"/>
+            <a:ext cx="2102040" cy="362160"/>
           </a:xfrm>
           <a:prstGeom prst="rect">
             <a:avLst/>
@@ -11904,7 +11992,7 @@
         <p:spPr>
           <a:xfrm>
             <a:off x="2373840" y="3866760"/>
-            <a:ext cx="294840" cy="362520"/>
+            <a:ext cx="294480" cy="362160"/>
           </a:xfrm>
           <a:prstGeom prst="rect">
             <a:avLst/>
@@ -11966,7 +12054,7 @@
         <p:spPr>
           <a:xfrm>
             <a:off x="3248640" y="3881880"/>
-            <a:ext cx="948600" cy="362520"/>
+            <a:ext cx="948240" cy="362160"/>
           </a:xfrm>
           <a:prstGeom prst="rect">
             <a:avLst/>
@@ -12028,7 +12116,7 @@
         <p:spPr>
           <a:xfrm>
             <a:off x="4683960" y="3866760"/>
-            <a:ext cx="294840" cy="362520"/>
+            <a:ext cx="294480" cy="362160"/>
           </a:xfrm>
           <a:prstGeom prst="rect">
             <a:avLst/>
@@ -12090,7 +12178,7 @@
         <p:spPr>
           <a:xfrm>
             <a:off x="5779080" y="3866400"/>
-            <a:ext cx="526320" cy="362520"/>
+            <a:ext cx="525960" cy="362160"/>
           </a:xfrm>
           <a:prstGeom prst="rect">
             <a:avLst/>
@@ -12152,7 +12240,7 @@
         <p:spPr>
           <a:xfrm>
             <a:off x="6783120" y="3866760"/>
-            <a:ext cx="633240" cy="362520"/>
+            <a:ext cx="632880" cy="362160"/>
           </a:xfrm>
           <a:prstGeom prst="rect">
             <a:avLst/>
@@ -12214,7 +12302,7 @@
         <p:spPr>
           <a:xfrm>
             <a:off x="8213760" y="3881880"/>
-            <a:ext cx="477720" cy="362520"/>
+            <a:ext cx="477360" cy="362160"/>
           </a:xfrm>
           <a:prstGeom prst="rect">
             <a:avLst/>
@@ -12356,7 +12444,7 @@
         <p:spPr>
           <a:xfrm>
             <a:off x="3855600" y="336600"/>
-            <a:ext cx="1252080" cy="362520"/>
+            <a:ext cx="1251720" cy="362160"/>
           </a:xfrm>
           <a:prstGeom prst="rect">
             <a:avLst/>
@@ -12604,7 +12692,7 @@
         <p:spPr>
           <a:xfrm>
             <a:off x="7938720" y="1004400"/>
-            <a:ext cx="1389960" cy="362520"/>
+            <a:ext cx="1389600" cy="362160"/>
           </a:xfrm>
           <a:prstGeom prst="rect">
             <a:avLst/>
@@ -12666,7 +12754,7 @@
         <p:spPr>
           <a:xfrm>
             <a:off x="2064960" y="961560"/>
-            <a:ext cx="1389960" cy="362520"/>
+            <a:ext cx="1389600" cy="362160"/>
           </a:xfrm>
           <a:prstGeom prst="rect">
             <a:avLst/>
@@ -12728,7 +12816,7 @@
         <p:spPr>
           <a:xfrm>
             <a:off x="3227760" y="992160"/>
-            <a:ext cx="1389960" cy="362520"/>
+            <a:ext cx="1389600" cy="362160"/>
           </a:xfrm>
           <a:prstGeom prst="rect">
             <a:avLst/>
@@ -12790,7 +12878,7 @@
         <p:spPr>
           <a:xfrm>
             <a:off x="4584240" y="989280"/>
-            <a:ext cx="1389960" cy="362520"/>
+            <a:ext cx="1389600" cy="362160"/>
           </a:xfrm>
           <a:prstGeom prst="rect">
             <a:avLst/>
@@ -12852,7 +12940,7 @@
         <p:spPr>
           <a:xfrm>
             <a:off x="5659560" y="992160"/>
-            <a:ext cx="1389960" cy="362520"/>
+            <a:ext cx="1389600" cy="362160"/>
           </a:xfrm>
           <a:prstGeom prst="rect">
             <a:avLst/>
@@ -12914,7 +13002,7 @@
         <p:spPr>
           <a:xfrm>
             <a:off x="6624000" y="1005480"/>
-            <a:ext cx="1389960" cy="362520"/>
+            <a:ext cx="1389600" cy="362160"/>
           </a:xfrm>
           <a:prstGeom prst="rect">
             <a:avLst/>
@@ -12976,7 +13064,7 @@
         <p:spPr>
           <a:xfrm>
             <a:off x="550080" y="973800"/>
-            <a:ext cx="1389960" cy="362520"/>
+            <a:ext cx="1389600" cy="362160"/>
           </a:xfrm>
           <a:prstGeom prst="rect">
             <a:avLst/>
@@ -13069,7 +13157,7 @@
         <p:spPr>
           <a:xfrm>
             <a:off x="91440" y="1422720"/>
-            <a:ext cx="2004480" cy="362520"/>
+            <a:ext cx="2004120" cy="362160"/>
           </a:xfrm>
           <a:prstGeom prst="rect">
             <a:avLst/>
@@ -13106,7 +13194,7 @@
                 <a:latin typeface="Calibri"/>
                 <a:ea typeface="DejaVu Sans"/>
               </a:rPr>
-              <a:t>Made Docker Swarm Mechanism</a:t>
+              <a:t>Make Docker Swarm Mechanism</a:t>
             </a:r>
             <a:endParaRPr b="0" lang="en-US" sz="1800" spc="-1" strike="noStrike">
               <a:solidFill>
@@ -13131,7 +13219,7 @@
         <p:spPr>
           <a:xfrm>
             <a:off x="2373840" y="1530000"/>
-            <a:ext cx="294840" cy="362520"/>
+            <a:ext cx="294480" cy="362160"/>
           </a:xfrm>
           <a:prstGeom prst="rect">
             <a:avLst/>
@@ -13193,7 +13281,7 @@
         <p:spPr>
           <a:xfrm>
             <a:off x="3248640" y="1545120"/>
-            <a:ext cx="948600" cy="362520"/>
+            <a:ext cx="948240" cy="362160"/>
           </a:xfrm>
           <a:prstGeom prst="rect">
             <a:avLst/>
@@ -13255,7 +13343,7 @@
         <p:spPr>
           <a:xfrm>
             <a:off x="4683960" y="1530000"/>
-            <a:ext cx="294840" cy="362520"/>
+            <a:ext cx="294480" cy="362160"/>
           </a:xfrm>
           <a:prstGeom prst="rect">
             <a:avLst/>
@@ -13317,7 +13405,7 @@
         <p:spPr>
           <a:xfrm>
             <a:off x="5779080" y="1529640"/>
-            <a:ext cx="526320" cy="362520"/>
+            <a:ext cx="525960" cy="362160"/>
           </a:xfrm>
           <a:prstGeom prst="rect">
             <a:avLst/>
@@ -13354,7 +13442,7 @@
                 <a:latin typeface="Calibri"/>
                 <a:ea typeface="DejaVu Sans"/>
               </a:rPr>
-              <a:t>0</a:t>
+              <a:t>20</a:t>
             </a:r>
             <a:endParaRPr b="0" lang="en-US" sz="1800" spc="-1" strike="noStrike">
               <a:solidFill>
@@ -13379,7 +13467,7 @@
         <p:spPr>
           <a:xfrm>
             <a:off x="6783120" y="1530000"/>
-            <a:ext cx="633240" cy="362520"/>
+            <a:ext cx="632880" cy="362160"/>
           </a:xfrm>
           <a:prstGeom prst="rect">
             <a:avLst/>
@@ -13416,7 +13504,7 @@
                 <a:latin typeface="Calibri"/>
                 <a:ea typeface="DejaVu Sans"/>
               </a:rPr>
-              <a:t>n/a</a:t>
+              <a:t>4 hr</a:t>
             </a:r>
             <a:endParaRPr b="0" lang="en-US" sz="1800" spc="-1" strike="noStrike">
               <a:solidFill>
@@ -13441,7 +13529,7 @@
         <p:spPr>
           <a:xfrm>
             <a:off x="8213760" y="1545120"/>
-            <a:ext cx="477720" cy="362520"/>
+            <a:ext cx="477360" cy="362160"/>
           </a:xfrm>
           <a:prstGeom prst="rect">
             <a:avLst/>
@@ -13478,7 +13566,7 @@
                 <a:latin typeface="Calibri"/>
                 <a:ea typeface="DejaVu Sans"/>
               </a:rPr>
-              <a:t>no</a:t>
+              <a:t>n/a</a:t>
             </a:r>
             <a:endParaRPr b="0" lang="en-US" sz="1800" spc="-1" strike="noStrike">
               <a:solidFill>
@@ -13534,7 +13622,7 @@
         <p:spPr>
           <a:xfrm>
             <a:off x="106920" y="91800"/>
-            <a:ext cx="1741320" cy="727560"/>
+            <a:ext cx="1740960" cy="727200"/>
           </a:xfrm>
           <a:prstGeom prst="rect">
             <a:avLst/>
@@ -13637,6 +13725,39 @@
                 <a:latin typeface="Calibri"/>
                 <a:ea typeface="DejaVu Sans"/>
               </a:rPr>
+              <a:t>Tim Curry</a:t>
+            </a:r>
+            <a:endParaRPr b="0" lang="en-US" sz="1400" spc="-1" strike="noStrike">
+              <a:solidFill>
+                <a:srgbClr val="000000"/>
+              </a:solidFill>
+              <a:uFill>
+                <a:solidFill>
+                  <a:srgbClr val="ffffff"/>
+                </a:solidFill>
+              </a:uFill>
+              <a:latin typeface="Arial"/>
+            </a:endParaRPr>
+          </a:p>
+          <a:p>
+            <a:pPr>
+              <a:lnSpc>
+                <a:spcPct val="100000"/>
+              </a:lnSpc>
+            </a:pPr>
+            <a:r>
+              <a:rPr b="0" lang="en-US" sz="1400" spc="-1" strike="noStrike">
+                <a:solidFill>
+                  <a:srgbClr val="000000"/>
+                </a:solidFill>
+                <a:uFill>
+                  <a:solidFill>
+                    <a:srgbClr val="ffffff"/>
+                  </a:solidFill>
+                </a:uFill>
+                <a:latin typeface="Calibri"/>
+                <a:ea typeface="DejaVu Sans"/>
+              </a:rPr>
               <a:t>CS 4900</a:t>
             </a:r>
             <a:endParaRPr b="0" lang="en-US" sz="1400" spc="-1" strike="noStrike">
@@ -13662,7 +13783,7 @@
         <p:spPr>
           <a:xfrm>
             <a:off x="8292600" y="91800"/>
-            <a:ext cx="788400" cy="362520"/>
+            <a:ext cx="788040" cy="362160"/>
           </a:xfrm>
           <a:prstGeom prst="rect">
             <a:avLst/>
@@ -13699,7 +13820,7 @@
                 <a:latin typeface="Calibri"/>
                 <a:ea typeface="DejaVu Sans"/>
               </a:rPr>
-              <a:t>Page 1</a:t>
+              <a:t>Page 3</a:t>
             </a:r>
             <a:endParaRPr b="0" lang="en-US" sz="1800" spc="-1" strike="noStrike">
               <a:solidFill>
@@ -13724,7 +13845,7 @@
         <p:spPr>
           <a:xfrm>
             <a:off x="3715560" y="565920"/>
-            <a:ext cx="1672560" cy="362520"/>
+            <a:ext cx="1672200" cy="362160"/>
           </a:xfrm>
           <a:prstGeom prst="rect">
             <a:avLst/>
@@ -13762,6 +13883,471 @@
                 <a:ea typeface="DejaVu Sans"/>
               </a:rPr>
               <a:t>Coding Tutorial</a:t>
+            </a:r>
+            <a:endParaRPr b="0" lang="en-US" sz="1800" spc="-1" strike="noStrike">
+              <a:solidFill>
+                <a:srgbClr val="000000"/>
+              </a:solidFill>
+              <a:uFill>
+                <a:solidFill>
+                  <a:srgbClr val="ffffff"/>
+                </a:solidFill>
+              </a:uFill>
+              <a:latin typeface="Arial"/>
+            </a:endParaRPr>
+          </a:p>
+        </p:txBody>
+      </p:sp>
+      <p:sp>
+        <p:nvSpPr>
+          <p:cNvPr id="236" name="CustomShape 27"/>
+          <p:cNvSpPr/>
+          <p:nvPr/>
+        </p:nvSpPr>
+        <p:spPr>
+          <a:xfrm>
+            <a:off x="2373840" y="2194560"/>
+            <a:ext cx="294480" cy="362160"/>
+          </a:xfrm>
+          <a:prstGeom prst="rect">
+            <a:avLst/>
+          </a:prstGeom>
+          <a:noFill/>
+          <a:ln>
+            <a:noFill/>
+          </a:ln>
+        </p:spPr>
+        <p:style>
+          <a:lnRef idx="0"/>
+          <a:fillRef idx="0"/>
+          <a:effectRef idx="0"/>
+          <a:fontRef idx="minor"/>
+        </p:style>
+        <p:txBody>
+          <a:bodyPr wrap="none" lIns="90000" rIns="90000" tIns="45000" bIns="45000"/>
+          <a:p>
+            <a:pPr>
+              <a:lnSpc>
+                <a:spcPct val="100000"/>
+              </a:lnSpc>
+            </a:pPr>
+            <a:r>
+              <a:rPr b="0" lang="en-US" sz="1800" spc="-1" strike="noStrike">
+                <a:solidFill>
+                  <a:srgbClr val="000000"/>
+                </a:solidFill>
+                <a:uFill>
+                  <a:solidFill>
+                    <a:srgbClr val="ffffff"/>
+                  </a:solidFill>
+                </a:uFill>
+                <a:latin typeface="Calibri"/>
+                <a:ea typeface="DejaVu Sans"/>
+              </a:rPr>
+              <a:t>3 hr</a:t>
+            </a:r>
+            <a:endParaRPr b="0" lang="en-US" sz="1800" spc="-1" strike="noStrike">
+              <a:solidFill>
+                <a:srgbClr val="000000"/>
+              </a:solidFill>
+              <a:uFill>
+                <a:solidFill>
+                  <a:srgbClr val="ffffff"/>
+                </a:solidFill>
+              </a:uFill>
+              <a:latin typeface="Arial"/>
+            </a:endParaRPr>
+          </a:p>
+        </p:txBody>
+      </p:sp>
+      <p:sp>
+        <p:nvSpPr>
+          <p:cNvPr id="237" name="CustomShape 28"/>
+          <p:cNvSpPr/>
+          <p:nvPr/>
+        </p:nvSpPr>
+        <p:spPr>
+          <a:xfrm>
+            <a:off x="3248640" y="2209680"/>
+            <a:ext cx="948240" cy="362160"/>
+          </a:xfrm>
+          <a:prstGeom prst="rect">
+            <a:avLst/>
+          </a:prstGeom>
+          <a:noFill/>
+          <a:ln>
+            <a:noFill/>
+          </a:ln>
+        </p:spPr>
+        <p:style>
+          <a:lnRef idx="0"/>
+          <a:fillRef idx="0"/>
+          <a:effectRef idx="0"/>
+          <a:fontRef idx="minor"/>
+        </p:style>
+        <p:txBody>
+          <a:bodyPr wrap="none" lIns="90000" rIns="90000" tIns="45000" bIns="45000"/>
+          <a:p>
+            <a:pPr>
+              <a:lnSpc>
+                <a:spcPct val="100000"/>
+              </a:lnSpc>
+            </a:pPr>
+            <a:r>
+              <a:rPr b="0" lang="en-US" sz="1800" spc="-1" strike="noStrike">
+                <a:solidFill>
+                  <a:srgbClr val="000000"/>
+                </a:solidFill>
+                <a:uFill>
+                  <a:solidFill>
+                    <a:srgbClr val="ffffff"/>
+                  </a:solidFill>
+                </a:uFill>
+                <a:latin typeface="Calibri"/>
+                <a:ea typeface="DejaVu Sans"/>
+              </a:rPr>
+              <a:t>Stephen</a:t>
+            </a:r>
+            <a:endParaRPr b="0" lang="en-US" sz="1800" spc="-1" strike="noStrike">
+              <a:solidFill>
+                <a:srgbClr val="000000"/>
+              </a:solidFill>
+              <a:uFill>
+                <a:solidFill>
+                  <a:srgbClr val="ffffff"/>
+                </a:solidFill>
+              </a:uFill>
+              <a:latin typeface="Arial"/>
+            </a:endParaRPr>
+          </a:p>
+        </p:txBody>
+      </p:sp>
+      <p:sp>
+        <p:nvSpPr>
+          <p:cNvPr id="238" name="CustomShape 29"/>
+          <p:cNvSpPr/>
+          <p:nvPr/>
+        </p:nvSpPr>
+        <p:spPr>
+          <a:xfrm>
+            <a:off x="4683960" y="2194560"/>
+            <a:ext cx="294480" cy="362160"/>
+          </a:xfrm>
+          <a:prstGeom prst="rect">
+            <a:avLst/>
+          </a:prstGeom>
+          <a:noFill/>
+          <a:ln>
+            <a:noFill/>
+          </a:ln>
+        </p:spPr>
+        <p:style>
+          <a:lnRef idx="0"/>
+          <a:fillRef idx="0"/>
+          <a:effectRef idx="0"/>
+          <a:fontRef idx="minor"/>
+        </p:style>
+        <p:txBody>
+          <a:bodyPr wrap="none" lIns="90000" rIns="90000" tIns="45000" bIns="45000"/>
+          <a:p>
+            <a:pPr>
+              <a:lnSpc>
+                <a:spcPct val="100000"/>
+              </a:lnSpc>
+            </a:pPr>
+            <a:r>
+              <a:rPr b="0" lang="en-US" sz="1800" spc="-1" strike="noStrike">
+                <a:solidFill>
+                  <a:srgbClr val="000000"/>
+                </a:solidFill>
+                <a:uFill>
+                  <a:solidFill>
+                    <a:srgbClr val="ffffff"/>
+                  </a:solidFill>
+                </a:uFill>
+                <a:latin typeface="Calibri"/>
+                <a:ea typeface="DejaVu Sans"/>
+              </a:rPr>
+              <a:t>2 hr</a:t>
+            </a:r>
+            <a:endParaRPr b="0" lang="en-US" sz="1800" spc="-1" strike="noStrike">
+              <a:solidFill>
+                <a:srgbClr val="000000"/>
+              </a:solidFill>
+              <a:uFill>
+                <a:solidFill>
+                  <a:srgbClr val="ffffff"/>
+                </a:solidFill>
+              </a:uFill>
+              <a:latin typeface="Arial"/>
+            </a:endParaRPr>
+          </a:p>
+        </p:txBody>
+      </p:sp>
+      <p:sp>
+        <p:nvSpPr>
+          <p:cNvPr id="239" name="CustomShape 30"/>
+          <p:cNvSpPr/>
+          <p:nvPr/>
+        </p:nvSpPr>
+        <p:spPr>
+          <a:xfrm>
+            <a:off x="5779080" y="2194200"/>
+            <a:ext cx="525960" cy="362160"/>
+          </a:xfrm>
+          <a:prstGeom prst="rect">
+            <a:avLst/>
+          </a:prstGeom>
+          <a:noFill/>
+          <a:ln>
+            <a:noFill/>
+          </a:ln>
+        </p:spPr>
+        <p:style>
+          <a:lnRef idx="0"/>
+          <a:fillRef idx="0"/>
+          <a:effectRef idx="0"/>
+          <a:fontRef idx="minor"/>
+        </p:style>
+        <p:txBody>
+          <a:bodyPr wrap="none" lIns="90000" rIns="90000" tIns="45000" bIns="45000"/>
+          <a:p>
+            <a:pPr>
+              <a:lnSpc>
+                <a:spcPct val="100000"/>
+              </a:lnSpc>
+            </a:pPr>
+            <a:r>
+              <a:rPr b="0" lang="en-US" sz="1800" spc="-1" strike="noStrike">
+                <a:solidFill>
+                  <a:srgbClr val="000000"/>
+                </a:solidFill>
+                <a:uFill>
+                  <a:solidFill>
+                    <a:srgbClr val="ffffff"/>
+                  </a:solidFill>
+                </a:uFill>
+                <a:latin typeface="Calibri"/>
+                <a:ea typeface="DejaVu Sans"/>
+              </a:rPr>
+              <a:t>90</a:t>
+            </a:r>
+            <a:endParaRPr b="0" lang="en-US" sz="1800" spc="-1" strike="noStrike">
+              <a:solidFill>
+                <a:srgbClr val="000000"/>
+              </a:solidFill>
+              <a:uFill>
+                <a:solidFill>
+                  <a:srgbClr val="ffffff"/>
+                </a:solidFill>
+              </a:uFill>
+              <a:latin typeface="Arial"/>
+            </a:endParaRPr>
+          </a:p>
+        </p:txBody>
+      </p:sp>
+      <p:sp>
+        <p:nvSpPr>
+          <p:cNvPr id="240" name="CustomShape 31"/>
+          <p:cNvSpPr/>
+          <p:nvPr/>
+        </p:nvSpPr>
+        <p:spPr>
+          <a:xfrm>
+            <a:off x="6783120" y="2194560"/>
+            <a:ext cx="632880" cy="362160"/>
+          </a:xfrm>
+          <a:prstGeom prst="rect">
+            <a:avLst/>
+          </a:prstGeom>
+          <a:noFill/>
+          <a:ln>
+            <a:noFill/>
+          </a:ln>
+        </p:spPr>
+        <p:style>
+          <a:lnRef idx="0"/>
+          <a:fillRef idx="0"/>
+          <a:effectRef idx="0"/>
+          <a:fontRef idx="minor"/>
+        </p:style>
+        <p:txBody>
+          <a:bodyPr wrap="none" lIns="90000" rIns="90000" tIns="45000" bIns="45000"/>
+          <a:p>
+            <a:pPr>
+              <a:lnSpc>
+                <a:spcPct val="100000"/>
+              </a:lnSpc>
+            </a:pPr>
+            <a:r>
+              <a:rPr b="0" lang="en-US" sz="1800" spc="-1" strike="noStrike">
+                <a:solidFill>
+                  <a:srgbClr val="000000"/>
+                </a:solidFill>
+                <a:uFill>
+                  <a:solidFill>
+                    <a:srgbClr val="ffffff"/>
+                  </a:solidFill>
+                </a:uFill>
+                <a:latin typeface="Calibri"/>
+                <a:ea typeface="DejaVu Sans"/>
+              </a:rPr>
+              <a:t>6 hr</a:t>
+            </a:r>
+            <a:endParaRPr b="0" lang="en-US" sz="1800" spc="-1" strike="noStrike">
+              <a:solidFill>
+                <a:srgbClr val="000000"/>
+              </a:solidFill>
+              <a:uFill>
+                <a:solidFill>
+                  <a:srgbClr val="ffffff"/>
+                </a:solidFill>
+              </a:uFill>
+              <a:latin typeface="Arial"/>
+            </a:endParaRPr>
+          </a:p>
+        </p:txBody>
+      </p:sp>
+      <p:sp>
+        <p:nvSpPr>
+          <p:cNvPr id="241" name="CustomShape 32"/>
+          <p:cNvSpPr/>
+          <p:nvPr/>
+        </p:nvSpPr>
+        <p:spPr>
+          <a:xfrm>
+            <a:off x="8213760" y="2209680"/>
+            <a:ext cx="477360" cy="362160"/>
+          </a:xfrm>
+          <a:prstGeom prst="rect">
+            <a:avLst/>
+          </a:prstGeom>
+          <a:noFill/>
+          <a:ln>
+            <a:noFill/>
+          </a:ln>
+        </p:spPr>
+        <p:style>
+          <a:lnRef idx="0"/>
+          <a:fillRef idx="0"/>
+          <a:effectRef idx="0"/>
+          <a:fontRef idx="minor"/>
+        </p:style>
+        <p:txBody>
+          <a:bodyPr wrap="none" lIns="90000" rIns="90000" tIns="45000" bIns="45000"/>
+          <a:p>
+            <a:pPr>
+              <a:lnSpc>
+                <a:spcPct val="100000"/>
+              </a:lnSpc>
+            </a:pPr>
+            <a:r>
+              <a:rPr b="0" lang="en-US" sz="1800" spc="-1" strike="noStrike">
+                <a:solidFill>
+                  <a:srgbClr val="000000"/>
+                </a:solidFill>
+                <a:uFill>
+                  <a:solidFill>
+                    <a:srgbClr val="ffffff"/>
+                  </a:solidFill>
+                </a:uFill>
+                <a:latin typeface="Calibri"/>
+                <a:ea typeface="DejaVu Sans"/>
+              </a:rPr>
+              <a:t>n/a</a:t>
+            </a:r>
+            <a:endParaRPr b="0" lang="en-US" sz="1800" spc="-1" strike="noStrike">
+              <a:solidFill>
+                <a:srgbClr val="000000"/>
+              </a:solidFill>
+              <a:uFill>
+                <a:solidFill>
+                  <a:srgbClr val="ffffff"/>
+                </a:solidFill>
+              </a:uFill>
+              <a:latin typeface="Arial"/>
+            </a:endParaRPr>
+          </a:p>
+        </p:txBody>
+      </p:sp>
+      <p:sp>
+        <p:nvSpPr>
+          <p:cNvPr id="242" name="Line 33"/>
+          <p:cNvSpPr/>
+          <p:nvPr/>
+        </p:nvSpPr>
+        <p:spPr>
+          <a:xfrm>
+            <a:off x="136800" y="2773080"/>
+            <a:ext cx="9006480" cy="44640"/>
+          </a:xfrm>
+          <a:prstGeom prst="line">
+            <a:avLst/>
+          </a:prstGeom>
+          <a:ln>
+            <a:round/>
+          </a:ln>
+        </p:spPr>
+        <p:style>
+          <a:lnRef idx="2">
+            <a:schemeClr val="accent1"/>
+          </a:lnRef>
+          <a:fillRef idx="0">
+            <a:schemeClr val="accent1"/>
+          </a:fillRef>
+          <a:effectRef idx="1">
+            <a:schemeClr val="accent1"/>
+          </a:effectRef>
+          <a:fontRef idx="minor"/>
+        </p:style>
+      </p:sp>
+      <p:sp>
+        <p:nvSpPr>
+          <p:cNvPr id="243" name="CustomShape 34"/>
+          <p:cNvSpPr/>
+          <p:nvPr/>
+        </p:nvSpPr>
+        <p:spPr>
+          <a:xfrm>
+            <a:off x="91440" y="2128320"/>
+            <a:ext cx="2004120" cy="362160"/>
+          </a:xfrm>
+          <a:prstGeom prst="rect">
+            <a:avLst/>
+          </a:prstGeom>
+          <a:noFill/>
+          <a:ln>
+            <a:noFill/>
+          </a:ln>
+        </p:spPr>
+        <p:style>
+          <a:lnRef idx="0"/>
+          <a:fillRef idx="0"/>
+          <a:effectRef idx="0"/>
+          <a:fontRef idx="minor"/>
+        </p:style>
+        <p:txBody>
+          <a:bodyPr lIns="90000" rIns="90000" tIns="45000" bIns="45000"/>
+          <a:p>
+            <a:pPr>
+              <a:lnSpc>
+                <a:spcPct val="100000"/>
+              </a:lnSpc>
+            </a:pPr>
+            <a:r>
+              <a:rPr b="0" lang="en-US" sz="1800" spc="-1" strike="noStrike">
+                <a:solidFill>
+                  <a:srgbClr val="000000"/>
+                </a:solidFill>
+                <a:uFill>
+                  <a:solidFill>
+                    <a:srgbClr val="ffffff"/>
+                  </a:solidFill>
+                </a:uFill>
+                <a:latin typeface="Calibri"/>
+                <a:ea typeface="DejaVu Sans"/>
+              </a:rPr>
+              <a:t>Clarify Installation Instructions</a:t>
             </a:r>
             <a:endParaRPr b="0" lang="en-US" sz="1800" spc="-1" strike="noStrike">
               <a:solidFill>
@@ -13828,14 +14414,14 @@
       </p:grpSpPr>
       <p:sp>
         <p:nvSpPr>
-          <p:cNvPr id="236" name="CustomShape 1"/>
+          <p:cNvPr id="244" name="CustomShape 1"/>
           <p:cNvSpPr/>
           <p:nvPr/>
         </p:nvSpPr>
         <p:spPr>
           <a:xfrm>
             <a:off x="4213440" y="214200"/>
-            <a:ext cx="904320" cy="393120"/>
+            <a:ext cx="903960" cy="392760"/>
           </a:xfrm>
           <a:prstGeom prst="rect">
             <a:avLst/>
@@ -13890,7 +14476,7 @@
       </p:sp>
       <p:sp>
         <p:nvSpPr>
-          <p:cNvPr id="237" name="Line 2"/>
+          <p:cNvPr id="245" name="Line 2"/>
           <p:cNvSpPr/>
           <p:nvPr/>
         </p:nvSpPr>
@@ -13921,7 +14507,7 @@
       </p:sp>
       <p:sp>
         <p:nvSpPr>
-          <p:cNvPr id="238" name="Line 3"/>
+          <p:cNvPr id="246" name="Line 3"/>
           <p:cNvSpPr/>
           <p:nvPr/>
         </p:nvSpPr>
@@ -13952,7 +14538,7 @@
       </p:sp>
       <p:sp>
         <p:nvSpPr>
-          <p:cNvPr id="239" name="Line 4"/>
+          <p:cNvPr id="247" name="Line 4"/>
           <p:cNvSpPr/>
           <p:nvPr/>
         </p:nvSpPr>
@@ -13983,14 +14569,14 @@
       </p:sp>
       <p:sp>
         <p:nvSpPr>
-          <p:cNvPr id="240" name="CustomShape 5"/>
+          <p:cNvPr id="248" name="CustomShape 5"/>
           <p:cNvSpPr/>
           <p:nvPr/>
         </p:nvSpPr>
         <p:spPr>
           <a:xfrm>
             <a:off x="446760" y="999360"/>
-            <a:ext cx="293400" cy="362520"/>
+            <a:ext cx="293040" cy="362160"/>
           </a:xfrm>
           <a:prstGeom prst="rect">
             <a:avLst/>
@@ -14045,14 +14631,14 @@
       </p:sp>
       <p:sp>
         <p:nvSpPr>
-          <p:cNvPr id="241" name="CustomShape 6"/>
+          <p:cNvPr id="249" name="CustomShape 6"/>
           <p:cNvSpPr/>
           <p:nvPr/>
         </p:nvSpPr>
         <p:spPr>
           <a:xfrm>
             <a:off x="1657800" y="999360"/>
-            <a:ext cx="599400" cy="362520"/>
+            <a:ext cx="599040" cy="362160"/>
           </a:xfrm>
           <a:prstGeom prst="rect">
             <a:avLst/>
@@ -14107,14 +14693,14 @@
       </p:sp>
       <p:sp>
         <p:nvSpPr>
-          <p:cNvPr id="242" name="CustomShape 7"/>
+          <p:cNvPr id="250" name="CustomShape 7"/>
           <p:cNvSpPr/>
           <p:nvPr/>
         </p:nvSpPr>
         <p:spPr>
           <a:xfrm>
             <a:off x="5293440" y="999360"/>
-            <a:ext cx="1265400" cy="362520"/>
+            <a:ext cx="1265040" cy="362160"/>
           </a:xfrm>
           <a:prstGeom prst="rect">
             <a:avLst/>
@@ -14169,14 +14755,14 @@
       </p:sp>
       <p:sp>
         <p:nvSpPr>
-          <p:cNvPr id="243" name="CustomShape 8"/>
+          <p:cNvPr id="251" name="CustomShape 8"/>
           <p:cNvSpPr/>
           <p:nvPr/>
         </p:nvSpPr>
         <p:spPr>
           <a:xfrm>
             <a:off x="430920" y="1459800"/>
-            <a:ext cx="294840" cy="362520"/>
+            <a:ext cx="294480" cy="362160"/>
           </a:xfrm>
           <a:prstGeom prst="rect">
             <a:avLst/>
@@ -14231,7 +14817,7 @@
       </p:sp>
       <p:sp>
         <p:nvSpPr>
-          <p:cNvPr id="244" name="Line 9"/>
+          <p:cNvPr id="252" name="Line 9"/>
           <p:cNvSpPr/>
           <p:nvPr/>
         </p:nvSpPr>
@@ -14262,7 +14848,7 @@
       </p:sp>
       <p:sp>
         <p:nvSpPr>
-          <p:cNvPr id="245" name="Line 10"/>
+          <p:cNvPr id="253" name="Line 10"/>
           <p:cNvSpPr/>
           <p:nvPr/>
         </p:nvSpPr>
@@ -14293,7 +14879,7 @@
       </p:sp>
       <p:sp>
         <p:nvSpPr>
-          <p:cNvPr id="246" name="Line 11"/>
+          <p:cNvPr id="254" name="Line 11"/>
           <p:cNvSpPr/>
           <p:nvPr/>
         </p:nvSpPr>
@@ -14324,7 +14910,7 @@
       </p:sp>
       <p:sp>
         <p:nvSpPr>
-          <p:cNvPr id="247" name="Line 12"/>
+          <p:cNvPr id="255" name="Line 12"/>
           <p:cNvSpPr/>
           <p:nvPr/>
         </p:nvSpPr>
@@ -14355,7 +14941,7 @@
       </p:sp>
       <p:sp>
         <p:nvSpPr>
-          <p:cNvPr id="248" name="Line 13"/>
+          <p:cNvPr id="256" name="Line 13"/>
           <p:cNvSpPr/>
           <p:nvPr/>
         </p:nvSpPr>
@@ -14386,7 +14972,7 @@
       </p:sp>
       <p:sp>
         <p:nvSpPr>
-          <p:cNvPr id="249" name="Line 14"/>
+          <p:cNvPr id="257" name="Line 14"/>
           <p:cNvSpPr/>
           <p:nvPr/>
         </p:nvSpPr>
@@ -14417,14 +15003,14 @@
       </p:sp>
       <p:sp>
         <p:nvSpPr>
-          <p:cNvPr id="250" name="CustomShape 15"/>
+          <p:cNvPr id="258" name="CustomShape 15"/>
           <p:cNvSpPr/>
           <p:nvPr/>
         </p:nvSpPr>
         <p:spPr>
           <a:xfrm>
             <a:off x="3383280" y="1452600"/>
-            <a:ext cx="5575680" cy="362520"/>
+            <a:ext cx="5575320" cy="362160"/>
           </a:xfrm>
           <a:prstGeom prst="rect">
             <a:avLst/>
@@ -14512,14 +15098,14 @@
       </p:sp>
       <p:sp>
         <p:nvSpPr>
-          <p:cNvPr id="251" name="CustomShape 16"/>
+          <p:cNvPr id="259" name="CustomShape 16"/>
           <p:cNvSpPr/>
           <p:nvPr/>
         </p:nvSpPr>
         <p:spPr>
           <a:xfrm>
             <a:off x="1043280" y="1459800"/>
-            <a:ext cx="1807920" cy="362520"/>
+            <a:ext cx="1807560" cy="362160"/>
           </a:xfrm>
           <a:prstGeom prst="rect">
             <a:avLst/>
@@ -14590,14 +15176,14 @@
       </p:sp>
       <p:sp>
         <p:nvSpPr>
-          <p:cNvPr id="252" name="CustomShape 17"/>
+          <p:cNvPr id="260" name="CustomShape 17"/>
           <p:cNvSpPr/>
           <p:nvPr/>
         </p:nvSpPr>
         <p:spPr>
           <a:xfrm>
             <a:off x="3884040" y="474480"/>
-            <a:ext cx="1672560" cy="362520"/>
+            <a:ext cx="1672200" cy="362160"/>
           </a:xfrm>
           <a:prstGeom prst="rect">
             <a:avLst/>
@@ -14652,14 +15238,14 @@
       </p:sp>
       <p:sp>
         <p:nvSpPr>
-          <p:cNvPr id="253" name="CustomShape 18"/>
+          <p:cNvPr id="261" name="CustomShape 18"/>
           <p:cNvSpPr/>
           <p:nvPr/>
         </p:nvSpPr>
         <p:spPr>
           <a:xfrm>
             <a:off x="8292600" y="91800"/>
-            <a:ext cx="788400" cy="362520"/>
+            <a:ext cx="788040" cy="362160"/>
           </a:xfrm>
           <a:prstGeom prst="rect">
             <a:avLst/>
@@ -14714,14 +15300,14 @@
       </p:sp>
       <p:sp>
         <p:nvSpPr>
-          <p:cNvPr id="254" name="CustomShape 19"/>
+          <p:cNvPr id="262" name="CustomShape 19"/>
           <p:cNvSpPr/>
           <p:nvPr/>
         </p:nvSpPr>
         <p:spPr>
           <a:xfrm>
             <a:off x="396000" y="2196720"/>
-            <a:ext cx="294840" cy="362520"/>
+            <a:ext cx="294480" cy="362160"/>
           </a:xfrm>
           <a:prstGeom prst="rect">
             <a:avLst/>
@@ -14776,14 +15362,14 @@
       </p:sp>
       <p:sp>
         <p:nvSpPr>
-          <p:cNvPr id="255" name="CustomShape 20"/>
+          <p:cNvPr id="263" name="CustomShape 20"/>
           <p:cNvSpPr/>
           <p:nvPr/>
         </p:nvSpPr>
         <p:spPr>
           <a:xfrm>
             <a:off x="3384360" y="2189520"/>
-            <a:ext cx="5575680" cy="362520"/>
+            <a:ext cx="5575320" cy="362160"/>
           </a:xfrm>
           <a:prstGeom prst="rect">
             <a:avLst/>
@@ -14871,14 +15457,14 @@
       </p:sp>
       <p:sp>
         <p:nvSpPr>
-          <p:cNvPr id="256" name="CustomShape 21"/>
+          <p:cNvPr id="264" name="CustomShape 21"/>
           <p:cNvSpPr/>
           <p:nvPr/>
         </p:nvSpPr>
         <p:spPr>
           <a:xfrm>
             <a:off x="1008360" y="2196720"/>
-            <a:ext cx="1807920" cy="362520"/>
+            <a:ext cx="1807560" cy="362160"/>
           </a:xfrm>
           <a:prstGeom prst="rect">
             <a:avLst/>
@@ -14897,14 +15483,14 @@
       </p:sp>
       <p:sp>
         <p:nvSpPr>
-          <p:cNvPr id="257" name="CustomShape 22"/>
+          <p:cNvPr id="265" name="CustomShape 22"/>
           <p:cNvSpPr/>
           <p:nvPr/>
         </p:nvSpPr>
         <p:spPr>
           <a:xfrm>
             <a:off x="396000" y="2196720"/>
-            <a:ext cx="294840" cy="362520"/>
+            <a:ext cx="294480" cy="362160"/>
           </a:xfrm>
           <a:prstGeom prst="rect">
             <a:avLst/>
@@ -14923,14 +15509,14 @@
       </p:sp>
       <p:sp>
         <p:nvSpPr>
-          <p:cNvPr id="258" name="CustomShape 23"/>
+          <p:cNvPr id="266" name="CustomShape 23"/>
           <p:cNvSpPr/>
           <p:nvPr/>
         </p:nvSpPr>
         <p:spPr>
           <a:xfrm>
             <a:off x="1008360" y="2196720"/>
-            <a:ext cx="1807920" cy="362520"/>
+            <a:ext cx="1807560" cy="362160"/>
           </a:xfrm>
           <a:prstGeom prst="rect">
             <a:avLst/>
@@ -15018,14 +15604,14 @@
       </p:sp>
       <p:sp>
         <p:nvSpPr>
-          <p:cNvPr id="259" name="CustomShape 24"/>
+          <p:cNvPr id="267" name="CustomShape 24"/>
           <p:cNvSpPr/>
           <p:nvPr/>
         </p:nvSpPr>
         <p:spPr>
           <a:xfrm>
             <a:off x="360000" y="2887200"/>
-            <a:ext cx="294840" cy="362520"/>
+            <a:ext cx="294480" cy="362160"/>
           </a:xfrm>
           <a:prstGeom prst="rect">
             <a:avLst/>
@@ -15080,14 +15666,14 @@
       </p:sp>
       <p:sp>
         <p:nvSpPr>
-          <p:cNvPr id="260" name="CustomShape 25"/>
+          <p:cNvPr id="268" name="CustomShape 25"/>
           <p:cNvSpPr/>
           <p:nvPr/>
         </p:nvSpPr>
         <p:spPr>
           <a:xfrm>
             <a:off x="3384360" y="2880000"/>
-            <a:ext cx="5575680" cy="362520"/>
+            <a:ext cx="5575320" cy="362160"/>
           </a:xfrm>
           <a:prstGeom prst="rect">
             <a:avLst/>
@@ -15142,14 +15728,14 @@
       </p:sp>
       <p:sp>
         <p:nvSpPr>
-          <p:cNvPr id="261" name="CustomShape 26"/>
+          <p:cNvPr id="269" name="CustomShape 26"/>
           <p:cNvSpPr/>
           <p:nvPr/>
         </p:nvSpPr>
         <p:spPr>
           <a:xfrm>
             <a:off x="972360" y="2887200"/>
-            <a:ext cx="1807920" cy="362520"/>
+            <a:ext cx="1807560" cy="362160"/>
           </a:xfrm>
           <a:prstGeom prst="rect">
             <a:avLst/>
@@ -15204,14 +15790,14 @@
       </p:sp>
       <p:sp>
         <p:nvSpPr>
-          <p:cNvPr id="262" name="CustomShape 27"/>
+          <p:cNvPr id="270" name="CustomShape 27"/>
           <p:cNvSpPr/>
           <p:nvPr/>
         </p:nvSpPr>
         <p:spPr>
           <a:xfrm>
             <a:off x="360000" y="3337920"/>
-            <a:ext cx="294840" cy="362520"/>
+            <a:ext cx="294480" cy="362160"/>
           </a:xfrm>
           <a:prstGeom prst="rect">
             <a:avLst/>
@@ -15266,14 +15852,14 @@
       </p:sp>
       <p:sp>
         <p:nvSpPr>
-          <p:cNvPr id="263" name="CustomShape 28"/>
+          <p:cNvPr id="271" name="CustomShape 28"/>
           <p:cNvSpPr/>
           <p:nvPr/>
         </p:nvSpPr>
         <p:spPr>
           <a:xfrm>
             <a:off x="3384360" y="3330720"/>
-            <a:ext cx="5575680" cy="362520"/>
+            <a:ext cx="5575320" cy="362160"/>
           </a:xfrm>
           <a:prstGeom prst="rect">
             <a:avLst/>
@@ -15328,14 +15914,14 @@
       </p:sp>
       <p:sp>
         <p:nvSpPr>
-          <p:cNvPr id="264" name="CustomShape 29"/>
+          <p:cNvPr id="272" name="CustomShape 29"/>
           <p:cNvSpPr/>
           <p:nvPr/>
         </p:nvSpPr>
         <p:spPr>
           <a:xfrm>
             <a:off x="972360" y="3337920"/>
-            <a:ext cx="1807920" cy="362520"/>
+            <a:ext cx="1807560" cy="362160"/>
           </a:xfrm>
           <a:prstGeom prst="rect">
             <a:avLst/>
@@ -15406,14 +15992,14 @@
       </p:sp>
       <p:sp>
         <p:nvSpPr>
-          <p:cNvPr id="265" name="CustomShape 30"/>
+          <p:cNvPr id="273" name="CustomShape 30"/>
           <p:cNvSpPr/>
           <p:nvPr/>
         </p:nvSpPr>
         <p:spPr>
           <a:xfrm>
             <a:off x="360000" y="4025520"/>
-            <a:ext cx="294840" cy="362520"/>
+            <a:ext cx="294480" cy="362160"/>
           </a:xfrm>
           <a:prstGeom prst="rect">
             <a:avLst/>
@@ -15468,14 +16054,14 @@
       </p:sp>
       <p:sp>
         <p:nvSpPr>
-          <p:cNvPr id="266" name="CustomShape 31"/>
+          <p:cNvPr id="274" name="CustomShape 31"/>
           <p:cNvSpPr/>
           <p:nvPr/>
         </p:nvSpPr>
         <p:spPr>
           <a:xfrm>
             <a:off x="3384360" y="4018320"/>
-            <a:ext cx="5575680" cy="362520"/>
+            <a:ext cx="5575320" cy="362160"/>
           </a:xfrm>
           <a:prstGeom prst="rect">
             <a:avLst/>
@@ -15563,14 +16149,14 @@
       </p:sp>
       <p:sp>
         <p:nvSpPr>
-          <p:cNvPr id="267" name="CustomShape 32"/>
+          <p:cNvPr id="275" name="CustomShape 32"/>
           <p:cNvSpPr/>
           <p:nvPr/>
         </p:nvSpPr>
         <p:spPr>
           <a:xfrm>
             <a:off x="972360" y="4025520"/>
-            <a:ext cx="1807920" cy="362520"/>
+            <a:ext cx="1807560" cy="362160"/>
           </a:xfrm>
           <a:prstGeom prst="rect">
             <a:avLst/>

</xml_diff>